<commit_message>
Some additions to the pp
that is all
</commit_message>
<xml_diff>
--- a/tfgPP.pptx
+++ b/tfgPP.pptx
@@ -125,7 +125,7 @@
   </p:defaultTextStyle>
   <p:extLst>
     <p:ext uri="{EFAFB233-063F-42B5-8137-9DF3F51BA10A}">
-      <p15:sldGuideLst xmlns:p15="http://schemas.microsoft.com/office/powerpoint/2012/main" xmlns="">
+      <p15:sldGuideLst xmlns:p15="http://schemas.microsoft.com/office/powerpoint/2012/main">
         <p15:guide id="1" orient="horz" pos="2160">
           <p15:clr>
             <a:srgbClr val="A4A3A4"/>
@@ -279,7 +279,7 @@
           <a:p>
             <a:fld id="{8161FC19-448B-45B3-ABDC-99AC11CB222E}" type="datetimeFigureOut">
               <a:rPr lang="es-ES" smtClean="0"/>
-              <a:t>03/07/2018</a:t>
+              <a:t>05/07/2018</a:t>
             </a:fld>
             <a:endParaRPr lang="es-ES" dirty="0"/>
           </a:p>
@@ -447,7 +447,7 @@
           <a:p>
             <a:fld id="{8161FC19-448B-45B3-ABDC-99AC11CB222E}" type="datetimeFigureOut">
               <a:rPr lang="es-ES" smtClean="0"/>
-              <a:t>03/07/2018</a:t>
+              <a:t>05/07/2018</a:t>
             </a:fld>
             <a:endParaRPr lang="es-ES" dirty="0"/>
           </a:p>
@@ -625,7 +625,7 @@
           <a:p>
             <a:fld id="{8161FC19-448B-45B3-ABDC-99AC11CB222E}" type="datetimeFigureOut">
               <a:rPr lang="es-ES" smtClean="0"/>
-              <a:t>03/07/2018</a:t>
+              <a:t>05/07/2018</a:t>
             </a:fld>
             <a:endParaRPr lang="es-ES" dirty="0"/>
           </a:p>
@@ -793,7 +793,7 @@
           <a:p>
             <a:fld id="{8161FC19-448B-45B3-ABDC-99AC11CB222E}" type="datetimeFigureOut">
               <a:rPr lang="es-ES" smtClean="0"/>
-              <a:t>03/07/2018</a:t>
+              <a:t>05/07/2018</a:t>
             </a:fld>
             <a:endParaRPr lang="es-ES" dirty="0"/>
           </a:p>
@@ -1038,7 +1038,7 @@
           <a:p>
             <a:fld id="{8161FC19-448B-45B3-ABDC-99AC11CB222E}" type="datetimeFigureOut">
               <a:rPr lang="es-ES" smtClean="0"/>
-              <a:t>03/07/2018</a:t>
+              <a:t>05/07/2018</a:t>
             </a:fld>
             <a:endParaRPr lang="es-ES" dirty="0"/>
           </a:p>
@@ -1267,7 +1267,7 @@
           <a:p>
             <a:fld id="{8161FC19-448B-45B3-ABDC-99AC11CB222E}" type="datetimeFigureOut">
               <a:rPr lang="es-ES" smtClean="0"/>
-              <a:t>03/07/2018</a:t>
+              <a:t>05/07/2018</a:t>
             </a:fld>
             <a:endParaRPr lang="es-ES" dirty="0"/>
           </a:p>
@@ -1631,7 +1631,7 @@
           <a:p>
             <a:fld id="{8161FC19-448B-45B3-ABDC-99AC11CB222E}" type="datetimeFigureOut">
               <a:rPr lang="es-ES" smtClean="0"/>
-              <a:t>03/07/2018</a:t>
+              <a:t>05/07/2018</a:t>
             </a:fld>
             <a:endParaRPr lang="es-ES" dirty="0"/>
           </a:p>
@@ -1748,7 +1748,7 @@
           <a:p>
             <a:fld id="{8161FC19-448B-45B3-ABDC-99AC11CB222E}" type="datetimeFigureOut">
               <a:rPr lang="es-ES" smtClean="0"/>
-              <a:t>03/07/2018</a:t>
+              <a:t>05/07/2018</a:t>
             </a:fld>
             <a:endParaRPr lang="es-ES" dirty="0"/>
           </a:p>
@@ -1843,7 +1843,7 @@
           <a:p>
             <a:fld id="{8161FC19-448B-45B3-ABDC-99AC11CB222E}" type="datetimeFigureOut">
               <a:rPr lang="es-ES" smtClean="0"/>
-              <a:t>03/07/2018</a:t>
+              <a:t>05/07/2018</a:t>
             </a:fld>
             <a:endParaRPr lang="es-ES" dirty="0"/>
           </a:p>
@@ -2118,7 +2118,7 @@
           <a:p>
             <a:fld id="{8161FC19-448B-45B3-ABDC-99AC11CB222E}" type="datetimeFigureOut">
               <a:rPr lang="es-ES" smtClean="0"/>
-              <a:t>03/07/2018</a:t>
+              <a:t>05/07/2018</a:t>
             </a:fld>
             <a:endParaRPr lang="es-ES" dirty="0"/>
           </a:p>
@@ -2370,7 +2370,7 @@
           <a:p>
             <a:fld id="{8161FC19-448B-45B3-ABDC-99AC11CB222E}" type="datetimeFigureOut">
               <a:rPr lang="es-ES" smtClean="0"/>
-              <a:t>03/07/2018</a:t>
+              <a:t>05/07/2018</a:t>
             </a:fld>
             <a:endParaRPr lang="es-ES" dirty="0"/>
           </a:p>
@@ -2581,7 +2581,7 @@
           <a:p>
             <a:fld id="{8161FC19-448B-45B3-ABDC-99AC11CB222E}" type="datetimeFigureOut">
               <a:rPr lang="es-ES" smtClean="0"/>
-              <a:t>03/07/2018</a:t>
+              <a:t>05/07/2018</a:t>
             </a:fld>
             <a:endParaRPr lang="es-ES" dirty="0"/>
           </a:p>
@@ -3651,7 +3651,7 @@
           <p:cNvPr id="2" name="Título 1">
             <a:extLst>
               <a:ext uri="{FF2B5EF4-FFF2-40B4-BE49-F238E27FC236}">
-                <a16:creationId xmlns="" xmlns:a16="http://schemas.microsoft.com/office/drawing/2014/main" id="{FEE365C5-F51C-45E4-AE98-9D2F02614E37}"/>
+                <a16:creationId xmlns:a16="http://schemas.microsoft.com/office/drawing/2014/main" xmlns="" id="{FEE365C5-F51C-45E4-AE98-9D2F02614E37}"/>
               </a:ext>
             </a:extLst>
           </p:cNvPr>
@@ -3688,7 +3688,7 @@
           <p:cNvPr id="3" name="Marcador de contenido 2">
             <a:extLst>
               <a:ext uri="{FF2B5EF4-FFF2-40B4-BE49-F238E27FC236}">
-                <a16:creationId xmlns="" xmlns:a16="http://schemas.microsoft.com/office/drawing/2014/main" id="{E2B73A5A-6803-4FB4-BBEF-89D34306EC50}"/>
+                <a16:creationId xmlns:a16="http://schemas.microsoft.com/office/drawing/2014/main" xmlns="" id="{E2B73A5A-6803-4FB4-BBEF-89D34306EC50}"/>
               </a:ext>
             </a:extLst>
           </p:cNvPr>
@@ -5376,13 +5376,6 @@
               </a:rPr>
               <a:t>Generación de consigna</a:t>
             </a:r>
-            <a:endParaRPr lang="es-ES" b="1" dirty="0">
-              <a:solidFill>
-                <a:schemeClr val="accent1">
-                  <a:lumMod val="50000"/>
-                </a:schemeClr>
-              </a:solidFill>
-            </a:endParaRPr>
           </a:p>
         </p:txBody>
       </p:sp>
@@ -6313,13 +6306,6 @@
               </a:rPr>
               <a:t>Controlador</a:t>
             </a:r>
-            <a:endParaRPr lang="es-ES" b="1" dirty="0">
-              <a:solidFill>
-                <a:schemeClr val="accent1">
-                  <a:lumMod val="50000"/>
-                </a:schemeClr>
-              </a:solidFill>
-            </a:endParaRPr>
           </a:p>
         </p:txBody>
       </p:sp>
@@ -6492,6 +6478,120 @@
           </a:extLst>
         </p:spPr>
       </p:pic>
+      <p:sp>
+        <p:nvSpPr>
+          <p:cNvPr id="7" name="10 Rectángulo"/>
+          <p:cNvSpPr/>
+          <p:nvPr/>
+        </p:nvSpPr>
+        <p:spPr>
+          <a:xfrm>
+            <a:off x="3429000" y="1690688"/>
+            <a:ext cx="2374900" cy="3554412"/>
+          </a:xfrm>
+          <a:prstGeom prst="rect">
+            <a:avLst/>
+          </a:prstGeom>
+          <a:noFill/>
+          <a:ln>
+            <a:solidFill>
+              <a:schemeClr val="accent1">
+                <a:lumMod val="40000"/>
+                <a:lumOff val="60000"/>
+              </a:schemeClr>
+            </a:solidFill>
+          </a:ln>
+          <a:effectLst>
+            <a:glow rad="139700">
+              <a:schemeClr val="accent1">
+                <a:satMod val="175000"/>
+                <a:alpha val="40000"/>
+              </a:schemeClr>
+            </a:glow>
+          </a:effectLst>
+        </p:spPr>
+        <p:style>
+          <a:lnRef idx="2">
+            <a:schemeClr val="accent1">
+              <a:shade val="50000"/>
+            </a:schemeClr>
+          </a:lnRef>
+          <a:fillRef idx="1">
+            <a:schemeClr val="accent1"/>
+          </a:fillRef>
+          <a:effectRef idx="0">
+            <a:schemeClr val="accent1"/>
+          </a:effectRef>
+          <a:fontRef idx="minor">
+            <a:schemeClr val="lt1"/>
+          </a:fontRef>
+        </p:style>
+        <p:txBody>
+          <a:bodyPr rtlCol="0" anchor="ctr"/>
+          <a:lstStyle/>
+          <a:p>
+            <a:pPr algn="ctr"/>
+            <a:endParaRPr lang="es-ES"/>
+          </a:p>
+        </p:txBody>
+      </p:sp>
+      <p:sp>
+        <p:nvSpPr>
+          <p:cNvPr id="9" name="10 Rectángulo"/>
+          <p:cNvSpPr/>
+          <p:nvPr/>
+        </p:nvSpPr>
+        <p:spPr>
+          <a:xfrm>
+            <a:off x="6208210" y="3360484"/>
+            <a:ext cx="2961190" cy="1732215"/>
+          </a:xfrm>
+          <a:prstGeom prst="rect">
+            <a:avLst/>
+          </a:prstGeom>
+          <a:noFill/>
+          <a:ln>
+            <a:solidFill>
+              <a:schemeClr val="accent1">
+                <a:lumMod val="40000"/>
+                <a:lumOff val="60000"/>
+              </a:schemeClr>
+            </a:solidFill>
+          </a:ln>
+          <a:effectLst>
+            <a:glow rad="139700">
+              <a:schemeClr val="accent1">
+                <a:satMod val="175000"/>
+                <a:alpha val="40000"/>
+              </a:schemeClr>
+            </a:glow>
+          </a:effectLst>
+        </p:spPr>
+        <p:style>
+          <a:lnRef idx="2">
+            <a:schemeClr val="accent1">
+              <a:shade val="50000"/>
+            </a:schemeClr>
+          </a:lnRef>
+          <a:fillRef idx="1">
+            <a:schemeClr val="accent1"/>
+          </a:fillRef>
+          <a:effectRef idx="0">
+            <a:schemeClr val="accent1"/>
+          </a:effectRef>
+          <a:fontRef idx="minor">
+            <a:schemeClr val="lt1"/>
+          </a:fontRef>
+        </p:style>
+        <p:txBody>
+          <a:bodyPr rtlCol="0" anchor="ctr"/>
+          <a:lstStyle/>
+          <a:p>
+            <a:pPr algn="ctr"/>
+            <a:endParaRPr lang="es-ES"/>
+          </a:p>
+        </p:txBody>
+      </p:sp>
     </p:spTree>
     <p:extLst>
       <p:ext uri="{BB962C8B-B14F-4D97-AF65-F5344CB8AC3E}">
@@ -6505,9 +6605,154 @@
   <p:timing>
     <p:tnLst>
       <p:par>
-        <p:cTn id="1" dur="indefinite" restart="never" nodeType="tmRoot"/>
+        <p:cTn id="1" dur="indefinite" restart="never" nodeType="tmRoot">
+          <p:childTnLst>
+            <p:seq concurrent="1" nextAc="seek">
+              <p:cTn id="2" dur="indefinite" nodeType="mainSeq">
+                <p:childTnLst>
+                  <p:par>
+                    <p:cTn id="3" fill="hold">
+                      <p:stCondLst>
+                        <p:cond delay="indefinite"/>
+                      </p:stCondLst>
+                      <p:childTnLst>
+                        <p:par>
+                          <p:cTn id="4" fill="hold">
+                            <p:stCondLst>
+                              <p:cond delay="0"/>
+                            </p:stCondLst>
+                            <p:childTnLst>
+                              <p:par>
+                                <p:cTn id="5" presetID="1" presetClass="entr" presetSubtype="0" fill="hold" grpId="0" nodeType="clickEffect">
+                                  <p:stCondLst>
+                                    <p:cond delay="0"/>
+                                  </p:stCondLst>
+                                  <p:childTnLst>
+                                    <p:set>
+                                      <p:cBhvr>
+                                        <p:cTn id="6" dur="1" fill="hold">
+                                          <p:stCondLst>
+                                            <p:cond delay="0"/>
+                                          </p:stCondLst>
+                                        </p:cTn>
+                                        <p:tgtEl>
+                                          <p:spTgt spid="7"/>
+                                        </p:tgtEl>
+                                        <p:attrNameLst>
+                                          <p:attrName>style.visibility</p:attrName>
+                                        </p:attrNameLst>
+                                      </p:cBhvr>
+                                      <p:to>
+                                        <p:strVal val="visible"/>
+                                      </p:to>
+                                    </p:set>
+                                  </p:childTnLst>
+                                </p:cTn>
+                              </p:par>
+                            </p:childTnLst>
+                          </p:cTn>
+                        </p:par>
+                      </p:childTnLst>
+                    </p:cTn>
+                  </p:par>
+                  <p:par>
+                    <p:cTn id="7" fill="hold">
+                      <p:stCondLst>
+                        <p:cond delay="indefinite"/>
+                      </p:stCondLst>
+                      <p:childTnLst>
+                        <p:par>
+                          <p:cTn id="8" fill="hold">
+                            <p:stCondLst>
+                              <p:cond delay="0"/>
+                            </p:stCondLst>
+                            <p:childTnLst>
+                              <p:par>
+                                <p:cTn id="9" presetID="1" presetClass="entr" presetSubtype="0" fill="hold" grpId="0" nodeType="clickEffect">
+                                  <p:stCondLst>
+                                    <p:cond delay="0"/>
+                                  </p:stCondLst>
+                                  <p:childTnLst>
+                                    <p:set>
+                                      <p:cBhvr>
+                                        <p:cTn id="10" dur="1" fill="hold">
+                                          <p:stCondLst>
+                                            <p:cond delay="0"/>
+                                          </p:stCondLst>
+                                        </p:cTn>
+                                        <p:tgtEl>
+                                          <p:spTgt spid="9"/>
+                                        </p:tgtEl>
+                                        <p:attrNameLst>
+                                          <p:attrName>style.visibility</p:attrName>
+                                        </p:attrNameLst>
+                                      </p:cBhvr>
+                                      <p:to>
+                                        <p:strVal val="visible"/>
+                                      </p:to>
+                                    </p:set>
+                                  </p:childTnLst>
+                                </p:cTn>
+                              </p:par>
+                              <p:par>
+                                <p:cTn id="11" presetID="1" presetClass="exit" presetSubtype="0" fill="hold" grpId="1" nodeType="withEffect">
+                                  <p:stCondLst>
+                                    <p:cond delay="0"/>
+                                  </p:stCondLst>
+                                  <p:childTnLst>
+                                    <p:set>
+                                      <p:cBhvr>
+                                        <p:cTn id="12" dur="1" fill="hold">
+                                          <p:stCondLst>
+                                            <p:cond delay="0"/>
+                                          </p:stCondLst>
+                                        </p:cTn>
+                                        <p:tgtEl>
+                                          <p:spTgt spid="7"/>
+                                        </p:tgtEl>
+                                        <p:attrNameLst>
+                                          <p:attrName>style.visibility</p:attrName>
+                                        </p:attrNameLst>
+                                      </p:cBhvr>
+                                      <p:to>
+                                        <p:strVal val="hidden"/>
+                                      </p:to>
+                                    </p:set>
+                                  </p:childTnLst>
+                                </p:cTn>
+                              </p:par>
+                            </p:childTnLst>
+                          </p:cTn>
+                        </p:par>
+                      </p:childTnLst>
+                    </p:cTn>
+                  </p:par>
+                </p:childTnLst>
+              </p:cTn>
+              <p:prevCondLst>
+                <p:cond evt="onPrev" delay="0">
+                  <p:tgtEl>
+                    <p:sldTgt/>
+                  </p:tgtEl>
+                </p:cond>
+              </p:prevCondLst>
+              <p:nextCondLst>
+                <p:cond evt="onNext" delay="0">
+                  <p:tgtEl>
+                    <p:sldTgt/>
+                  </p:tgtEl>
+                </p:cond>
+              </p:nextCondLst>
+            </p:seq>
+          </p:childTnLst>
+        </p:cTn>
       </p:par>
     </p:tnLst>
+    <p:bldLst>
+      <p:bldP spid="7" grpId="0" animBg="1"/>
+      <p:bldP spid="7" grpId="1" animBg="1"/>
+      <p:bldP spid="9" grpId="0" animBg="1"/>
+    </p:bldLst>
   </p:timing>
 </p:sld>
 </file>
@@ -6940,32 +7185,6 @@
               </a:rPr>
               <a:t>Casos de estudio</a:t>
             </a:r>
-            <a:endParaRPr lang="es-ES" b="1" dirty="0">
-              <a:solidFill>
-                <a:schemeClr val="accent1">
-                  <a:lumMod val="50000"/>
-                </a:schemeClr>
-              </a:solidFill>
-            </a:endParaRPr>
-          </a:p>
-        </p:txBody>
-      </p:sp>
-      <p:sp>
-        <p:nvSpPr>
-          <p:cNvPr id="3" name="2 Marcador de contenido"/>
-          <p:cNvSpPr>
-            <a:spLocks noGrp="1"/>
-          </p:cNvSpPr>
-          <p:nvPr>
-            <p:ph idx="1"/>
-          </p:nvPr>
-        </p:nvSpPr>
-        <p:spPr/>
-        <p:txBody>
-          <a:bodyPr/>
-          <a:lstStyle/>
-          <a:p>
-            <a:endParaRPr lang="es-ES"/>
           </a:p>
         </p:txBody>
       </p:sp>
@@ -7097,6 +7316,264 @@
           </a:extLst>
         </p:spPr>
       </p:pic>
+      <p:graphicFrame>
+        <p:nvGraphicFramePr>
+          <p:cNvPr id="4" name="Tabla 3"/>
+          <p:cNvGraphicFramePr>
+            <a:graphicFrameLocks noGrp="1"/>
+          </p:cNvGraphicFramePr>
+          <p:nvPr>
+            <p:extLst>
+              <p:ext uri="{D42A27DB-BD31-4B8C-83A1-F6EECF244321}">
+                <p14:modId xmlns:p14="http://schemas.microsoft.com/office/powerpoint/2010/main" val="3565933156"/>
+              </p:ext>
+            </p:extLst>
+          </p:nvPr>
+        </p:nvGraphicFramePr>
+        <p:xfrm>
+          <a:off x="1104901" y="1924099"/>
+          <a:ext cx="6692901" cy="2067484"/>
+        </p:xfrm>
+        <a:graphic>
+          <a:graphicData uri="http://schemas.openxmlformats.org/drawingml/2006/table">
+            <a:tbl>
+              <a:tblPr firstRow="1" bandRow="1">
+                <a:tableStyleId>{5C22544A-7EE6-4342-B048-85BDC9FD1C3A}</a:tableStyleId>
+              </a:tblPr>
+              <a:tblGrid>
+                <a:gridCol w="2230967"/>
+                <a:gridCol w="2230967"/>
+                <a:gridCol w="2230967"/>
+              </a:tblGrid>
+              <a:tr h="488976">
+                <a:tc>
+                  <a:txBody>
+                    <a:bodyPr/>
+                    <a:lstStyle/>
+                    <a:p>
+                      <a:endParaRPr lang="es-ES" dirty="0"/>
+                    </a:p>
+                  </a:txBody>
+                  <a:tcPr>
+                    <a:solidFill>
+                      <a:schemeClr val="bg1"/>
+                    </a:solidFill>
+                  </a:tcPr>
+                </a:tc>
+                <a:tc>
+                  <a:txBody>
+                    <a:bodyPr/>
+                    <a:lstStyle/>
+                    <a:p>
+                      <a:pPr algn="ctr"/>
+                      <a:r>
+                        <a:rPr lang="es-ES" sz="2800" dirty="0" smtClean="0"/>
+                        <a:t>C</a:t>
+                      </a:r>
+                      <a:endParaRPr lang="es-ES" sz="2800" dirty="0"/>
+                    </a:p>
+                  </a:txBody>
+                  <a:tcPr/>
+                </a:tc>
+                <a:tc>
+                  <a:txBody>
+                    <a:bodyPr/>
+                    <a:lstStyle/>
+                    <a:p>
+                      <a:pPr algn="ctr"/>
+                      <a:r>
+                        <a:rPr lang="es-ES" sz="2800" dirty="0" smtClean="0"/>
+                        <a:t>L</a:t>
+                      </a:r>
+                      <a:endParaRPr lang="es-ES" sz="2800" dirty="0"/>
+                    </a:p>
+                  </a:txBody>
+                  <a:tcPr/>
+                </a:tc>
+              </a:tr>
+              <a:tr h="559640">
+                <a:tc>
+                  <a:txBody>
+                    <a:bodyPr/>
+                    <a:lstStyle/>
+                    <a:p>
+                      <a:pPr algn="ctr"/>
+                      <a:r>
+                        <a:rPr lang="es-ES" dirty="0" smtClean="0"/>
+                        <a:t>0W</a:t>
+                      </a:r>
+                      <a:endParaRPr lang="es-ES" dirty="0"/>
+                    </a:p>
+                  </a:txBody>
+                  <a:tcPr/>
+                </a:tc>
+                <a:tc>
+                  <a:txBody>
+                    <a:bodyPr/>
+                    <a:lstStyle/>
+                    <a:p>
+                      <a:pPr algn="ctr"/>
+                      <a:r>
+                        <a:rPr lang="es-ES" dirty="0" smtClean="0"/>
+                        <a:t>1</a:t>
+                      </a:r>
+                      <a:endParaRPr lang="es-ES" dirty="0"/>
+                    </a:p>
+                  </a:txBody>
+                  <a:tcPr/>
+                </a:tc>
+                <a:tc>
+                  <a:txBody>
+                    <a:bodyPr/>
+                    <a:lstStyle/>
+                    <a:p>
+                      <a:pPr algn="ctr"/>
+                      <a:r>
+                        <a:rPr lang="es-ES" dirty="0" smtClean="0"/>
+                        <a:t>2</a:t>
+                      </a:r>
+                      <a:endParaRPr lang="es-ES" dirty="0"/>
+                    </a:p>
+                  </a:txBody>
+                  <a:tcPr/>
+                </a:tc>
+              </a:tr>
+              <a:tr h="482461">
+                <a:tc>
+                  <a:txBody>
+                    <a:bodyPr/>
+                    <a:lstStyle/>
+                    <a:p>
+                      <a:pPr algn="ctr"/>
+                      <a:r>
+                        <a:rPr lang="es-ES" dirty="0" smtClean="0"/>
+                        <a:t>1MW</a:t>
+                      </a:r>
+                      <a:endParaRPr lang="es-ES" dirty="0"/>
+                    </a:p>
+                  </a:txBody>
+                  <a:tcPr/>
+                </a:tc>
+                <a:tc>
+                  <a:txBody>
+                    <a:bodyPr/>
+                    <a:lstStyle/>
+                    <a:p>
+                      <a:pPr algn="ctr"/>
+                      <a:r>
+                        <a:rPr lang="es-ES" dirty="0" smtClean="0"/>
+                        <a:t>3</a:t>
+                      </a:r>
+                      <a:endParaRPr lang="es-ES" dirty="0"/>
+                    </a:p>
+                  </a:txBody>
+                  <a:tcPr/>
+                </a:tc>
+                <a:tc>
+                  <a:txBody>
+                    <a:bodyPr/>
+                    <a:lstStyle/>
+                    <a:p>
+                      <a:pPr algn="ctr"/>
+                      <a:r>
+                        <a:rPr lang="es-ES" dirty="0" smtClean="0"/>
+                        <a:t>4</a:t>
+                      </a:r>
+                      <a:endParaRPr lang="es-ES" dirty="0"/>
+                    </a:p>
+                  </a:txBody>
+                  <a:tcPr/>
+                </a:tc>
+              </a:tr>
+              <a:tr h="507223">
+                <a:tc>
+                  <a:txBody>
+                    <a:bodyPr/>
+                    <a:lstStyle/>
+                    <a:p>
+                      <a:pPr algn="ctr"/>
+                      <a:r>
+                        <a:rPr lang="es-ES" dirty="0" smtClean="0"/>
+                        <a:t>7,5GW</a:t>
+                      </a:r>
+                      <a:endParaRPr lang="es-ES" dirty="0"/>
+                    </a:p>
+                  </a:txBody>
+                  <a:tcPr/>
+                </a:tc>
+                <a:tc>
+                  <a:txBody>
+                    <a:bodyPr/>
+                    <a:lstStyle/>
+                    <a:p>
+                      <a:pPr algn="ctr"/>
+                      <a:r>
+                        <a:rPr lang="es-ES" dirty="0" smtClean="0"/>
+                        <a:t>5</a:t>
+                      </a:r>
+                      <a:endParaRPr lang="es-ES" dirty="0"/>
+                    </a:p>
+                  </a:txBody>
+                  <a:tcPr/>
+                </a:tc>
+                <a:tc>
+                  <a:txBody>
+                    <a:bodyPr/>
+                    <a:lstStyle/>
+                    <a:p>
+                      <a:pPr algn="ctr"/>
+                      <a:r>
+                        <a:rPr lang="es-ES" dirty="0" smtClean="0"/>
+                        <a:t>6</a:t>
+                      </a:r>
+                      <a:endParaRPr lang="es-ES" dirty="0"/>
+                    </a:p>
+                  </a:txBody>
+                  <a:tcPr/>
+                </a:tc>
+              </a:tr>
+            </a:tbl>
+          </a:graphicData>
+        </a:graphic>
+      </p:graphicFrame>
+      <p:sp>
+        <p:nvSpPr>
+          <p:cNvPr id="7" name="CuadroTexto 6"/>
+          <p:cNvSpPr txBox="1"/>
+          <p:nvPr/>
+        </p:nvSpPr>
+        <p:spPr>
+          <a:xfrm>
+            <a:off x="1104901" y="4406900"/>
+            <a:ext cx="7759699" cy="923330"/>
+          </a:xfrm>
+          <a:prstGeom prst="rect">
+            <a:avLst/>
+          </a:prstGeom>
+          <a:noFill/>
+        </p:spPr>
+        <p:txBody>
+          <a:bodyPr wrap="square" rtlCol="0">
+            <a:spAutoFit/>
+          </a:bodyPr>
+          <a:lstStyle/>
+          <a:p>
+            <a:pPr algn="just"/>
+            <a:r>
+              <a:rPr lang="es-ES" dirty="0" smtClean="0"/>
+              <a:t>Ensayo 1: Cumplir el código de red ante diferentes variaciones de tensión</a:t>
+            </a:r>
+          </a:p>
+          <a:p>
+            <a:pPr algn="just"/>
+            <a:r>
+              <a:rPr lang="es-ES" dirty="0" smtClean="0"/>
+              <a:t>Ensayo 2: Comparar los resultados entre no aplicar ningún tipo de compensación, aplicar la del código de red y compensar con la reactancia de la planta</a:t>
+            </a:r>
+            <a:endParaRPr lang="es-ES" dirty="0"/>
+          </a:p>
+        </p:txBody>
+      </p:sp>
     </p:spTree>
     <p:extLst>
       <p:ext uri="{BB962C8B-B14F-4D97-AF65-F5344CB8AC3E}">
@@ -7545,13 +8022,6 @@
               </a:rPr>
               <a:t>Resultados</a:t>
             </a:r>
-            <a:endParaRPr lang="es-ES" b="1" dirty="0">
-              <a:solidFill>
-                <a:schemeClr val="accent1">
-                  <a:lumMod val="50000"/>
-                </a:schemeClr>
-              </a:solidFill>
-            </a:endParaRPr>
           </a:p>
         </p:txBody>
       </p:sp>
@@ -7725,7 +8195,7 @@
           <p:cNvPr id="2" name="Título 1">
             <a:extLst>
               <a:ext uri="{FF2B5EF4-FFF2-40B4-BE49-F238E27FC236}">
-                <a16:creationId xmlns="" xmlns:a16="http://schemas.microsoft.com/office/drawing/2014/main" id="{7CE1135B-07BD-441E-96D7-85BD4835A7ED}"/>
+                <a16:creationId xmlns:a16="http://schemas.microsoft.com/office/drawing/2014/main" xmlns="" id="{7CE1135B-07BD-441E-96D7-85BD4835A7ED}"/>
               </a:ext>
             </a:extLst>
           </p:cNvPr>
@@ -7754,13 +8224,6 @@
               </a:rPr>
               <a:t>Conclusiones del primer ensayo</a:t>
             </a:r>
-            <a:endParaRPr lang="es-ES" b="1" dirty="0">
-              <a:solidFill>
-                <a:schemeClr val="accent1">
-                  <a:lumMod val="50000"/>
-                </a:schemeClr>
-              </a:solidFill>
-            </a:endParaRPr>
           </a:p>
         </p:txBody>
       </p:sp>
@@ -7769,7 +8232,7 @@
           <p:cNvPr id="3" name="Marcador de contenido 2">
             <a:extLst>
               <a:ext uri="{FF2B5EF4-FFF2-40B4-BE49-F238E27FC236}">
-                <a16:creationId xmlns="" xmlns:a16="http://schemas.microsoft.com/office/drawing/2014/main" id="{8494C532-DF3D-48DB-A603-9E1A5F3ADD2D}"/>
+                <a16:creationId xmlns:a16="http://schemas.microsoft.com/office/drawing/2014/main" xmlns="" id="{8494C532-DF3D-48DB-A603-9E1A5F3ADD2D}"/>
               </a:ext>
             </a:extLst>
           </p:cNvPr>
@@ -7977,7 +8440,7 @@
           <p:cNvPr id="2" name="Título 1">
             <a:extLst>
               <a:ext uri="{FF2B5EF4-FFF2-40B4-BE49-F238E27FC236}">
-                <a16:creationId xmlns="" xmlns:a16="http://schemas.microsoft.com/office/drawing/2014/main" id="{7CE1135B-07BD-441E-96D7-85BD4835A7ED}"/>
+                <a16:creationId xmlns:a16="http://schemas.microsoft.com/office/drawing/2014/main" xmlns="" id="{7CE1135B-07BD-441E-96D7-85BD4835A7ED}"/>
               </a:ext>
             </a:extLst>
           </p:cNvPr>
@@ -8006,13 +8469,6 @@
               </a:rPr>
               <a:t>Conclusiones del segundo ensayo</a:t>
             </a:r>
-            <a:endParaRPr lang="es-ES" b="1" dirty="0">
-              <a:solidFill>
-                <a:schemeClr val="accent1">
-                  <a:lumMod val="50000"/>
-                </a:schemeClr>
-              </a:solidFill>
-            </a:endParaRPr>
           </a:p>
         </p:txBody>
       </p:sp>
@@ -8021,7 +8477,7 @@
           <p:cNvPr id="3" name="Marcador de contenido 2">
             <a:extLst>
               <a:ext uri="{FF2B5EF4-FFF2-40B4-BE49-F238E27FC236}">
-                <a16:creationId xmlns="" xmlns:a16="http://schemas.microsoft.com/office/drawing/2014/main" id="{8494C532-DF3D-48DB-A603-9E1A5F3ADD2D}"/>
+                <a16:creationId xmlns:a16="http://schemas.microsoft.com/office/drawing/2014/main" xmlns="" id="{8494C532-DF3D-48DB-A603-9E1A5F3ADD2D}"/>
               </a:ext>
             </a:extLst>
           </p:cNvPr>
@@ -8568,7 +9024,7 @@
           <p:cNvPr id="2" name="Título 1">
             <a:extLst>
               <a:ext uri="{FF2B5EF4-FFF2-40B4-BE49-F238E27FC236}">
-                <a16:creationId xmlns="" xmlns:a16="http://schemas.microsoft.com/office/drawing/2014/main" id="{7CE1135B-07BD-441E-96D7-85BD4835A7ED}"/>
+                <a16:creationId xmlns:a16="http://schemas.microsoft.com/office/drawing/2014/main" xmlns="" id="{7CE1135B-07BD-441E-96D7-85BD4835A7ED}"/>
               </a:ext>
             </a:extLst>
           </p:cNvPr>
@@ -8597,13 +9053,6 @@
               </a:rPr>
               <a:t>Estudios futuros</a:t>
             </a:r>
-            <a:endParaRPr lang="es-ES" b="1" dirty="0">
-              <a:solidFill>
-                <a:schemeClr val="accent1">
-                  <a:lumMod val="50000"/>
-                </a:schemeClr>
-              </a:solidFill>
-            </a:endParaRPr>
           </a:p>
         </p:txBody>
       </p:sp>
@@ -8612,7 +9061,7 @@
           <p:cNvPr id="3" name="Marcador de contenido 2">
             <a:extLst>
               <a:ext uri="{FF2B5EF4-FFF2-40B4-BE49-F238E27FC236}">
-                <a16:creationId xmlns="" xmlns:a16="http://schemas.microsoft.com/office/drawing/2014/main" id="{8494C532-DF3D-48DB-A603-9E1A5F3ADD2D}"/>
+                <a16:creationId xmlns:a16="http://schemas.microsoft.com/office/drawing/2014/main" xmlns="" id="{8494C532-DF3D-48DB-A603-9E1A5F3ADD2D}"/>
               </a:ext>
             </a:extLst>
           </p:cNvPr>
@@ -10526,7 +10975,7 @@
           <p:cNvPr id="2" name="Título 1">
             <a:extLst>
               <a:ext uri="{FF2B5EF4-FFF2-40B4-BE49-F238E27FC236}">
-                <a16:creationId xmlns="" xmlns:a16="http://schemas.microsoft.com/office/drawing/2014/main" id="{E122A83D-3967-4BBC-B0B7-E31CB4FB61D5}"/>
+                <a16:creationId xmlns:a16="http://schemas.microsoft.com/office/drawing/2014/main" xmlns="" id="{E122A83D-3967-4BBC-B0B7-E31CB4FB61D5}"/>
               </a:ext>
             </a:extLst>
           </p:cNvPr>
@@ -10563,7 +11012,7 @@
           <p:cNvPr id="3" name="Marcador de contenido 2">
             <a:extLst>
               <a:ext uri="{FF2B5EF4-FFF2-40B4-BE49-F238E27FC236}">
-                <a16:creationId xmlns="" xmlns:a16="http://schemas.microsoft.com/office/drawing/2014/main" id="{A79EC906-CFDB-4506-8B2F-E22EC5418D18}"/>
+                <a16:creationId xmlns:a16="http://schemas.microsoft.com/office/drawing/2014/main" xmlns="" id="{A79EC906-CFDB-4506-8B2F-E22EC5418D18}"/>
               </a:ext>
             </a:extLst>
           </p:cNvPr>
@@ -11340,7 +11789,7 @@
           <p:cNvPr id="2" name="Título 1">
             <a:extLst>
               <a:ext uri="{FF2B5EF4-FFF2-40B4-BE49-F238E27FC236}">
-                <a16:creationId xmlns="" xmlns:a16="http://schemas.microsoft.com/office/drawing/2014/main" id="{960643AA-8DEE-49EF-848B-2A646FDDAF27}"/>
+                <a16:creationId xmlns:a16="http://schemas.microsoft.com/office/drawing/2014/main" xmlns="" id="{960643AA-8DEE-49EF-848B-2A646FDDAF27}"/>
               </a:ext>
             </a:extLst>
           </p:cNvPr>
@@ -11375,7 +11824,7 @@
           <p:cNvPr id="3" name="Marcador de contenido 2">
             <a:extLst>
               <a:ext uri="{FF2B5EF4-FFF2-40B4-BE49-F238E27FC236}">
-                <a16:creationId xmlns="" xmlns:a16="http://schemas.microsoft.com/office/drawing/2014/main" id="{80A64E0C-CB3C-4B33-9667-CAFFFFAD0B40}"/>
+                <a16:creationId xmlns:a16="http://schemas.microsoft.com/office/drawing/2014/main" xmlns="" id="{80A64E0C-CB3C-4B33-9667-CAFFFFAD0B40}"/>
               </a:ext>
             </a:extLst>
           </p:cNvPr>
@@ -12847,7 +13296,7 @@
   <a:extraClrSchemeLst/>
   <a:extLst>
     <a:ext uri="{05A4C25C-085E-4340-85A3-A5531E510DB2}">
-      <thm15:themeFamily xmlns:thm15="http://schemas.microsoft.com/office/thememl/2012/main" xmlns="" name="Office Theme" id="{62F939B6-93AF-4DB8-9C6B-D6C7DFDC589F}" vid="{4A3C46E8-61CC-4603-A589-7422A47A8E4A}"/>
+      <thm15:themeFamily xmlns:thm15="http://schemas.microsoft.com/office/thememl/2012/main" name="Office Theme" id="{62F939B6-93AF-4DB8-9C6B-D6C7DFDC589F}" vid="{4A3C46E8-61CC-4603-A589-7422A47A8E4A}"/>
     </a:ext>
   </a:extLst>
 </a:theme>

</xml_diff>

<commit_message>
Definitve version of the PP
I hope is good enough
</commit_message>
<xml_diff>
--- a/tfgPP.pptx
+++ b/tfgPP.pptx
@@ -24,12 +24,14 @@
     <p:sldId id="276" r:id="rId18"/>
     <p:sldId id="269" r:id="rId19"/>
     <p:sldId id="277" r:id="rId20"/>
-    <p:sldId id="279" r:id="rId21"/>
-    <p:sldId id="280" r:id="rId22"/>
-    <p:sldId id="263" r:id="rId23"/>
-    <p:sldId id="264" r:id="rId24"/>
-    <p:sldId id="265" r:id="rId25"/>
-    <p:sldId id="282" r:id="rId26"/>
+    <p:sldId id="283" r:id="rId21"/>
+    <p:sldId id="279" r:id="rId22"/>
+    <p:sldId id="284" r:id="rId23"/>
+    <p:sldId id="280" r:id="rId24"/>
+    <p:sldId id="263" r:id="rId25"/>
+    <p:sldId id="264" r:id="rId26"/>
+    <p:sldId id="265" r:id="rId27"/>
+    <p:sldId id="282" r:id="rId28"/>
   </p:sldIdLst>
   <p:sldSz cx="12192000" cy="6858000"/>
   <p:notesSz cx="6858000" cy="9144000"/>
@@ -284,7 +286,7 @@
           <a:p>
             <a:fld id="{8161FC19-448B-45B3-ABDC-99AC11CB222E}" type="datetimeFigureOut">
               <a:rPr lang="es-ES" smtClean="0"/>
-              <a:t>07/07/2018</a:t>
+              <a:t>08/07/2018</a:t>
             </a:fld>
             <a:endParaRPr lang="es-ES" dirty="0"/>
           </a:p>
@@ -452,7 +454,7 @@
           <a:p>
             <a:fld id="{8161FC19-448B-45B3-ABDC-99AC11CB222E}" type="datetimeFigureOut">
               <a:rPr lang="es-ES" smtClean="0"/>
-              <a:t>07/07/2018</a:t>
+              <a:t>08/07/2018</a:t>
             </a:fld>
             <a:endParaRPr lang="es-ES" dirty="0"/>
           </a:p>
@@ -630,7 +632,7 @@
           <a:p>
             <a:fld id="{8161FC19-448B-45B3-ABDC-99AC11CB222E}" type="datetimeFigureOut">
               <a:rPr lang="es-ES" smtClean="0"/>
-              <a:t>07/07/2018</a:t>
+              <a:t>08/07/2018</a:t>
             </a:fld>
             <a:endParaRPr lang="es-ES" dirty="0"/>
           </a:p>
@@ -798,7 +800,7 @@
           <a:p>
             <a:fld id="{8161FC19-448B-45B3-ABDC-99AC11CB222E}" type="datetimeFigureOut">
               <a:rPr lang="es-ES" smtClean="0"/>
-              <a:t>07/07/2018</a:t>
+              <a:t>08/07/2018</a:t>
             </a:fld>
             <a:endParaRPr lang="es-ES" dirty="0"/>
           </a:p>
@@ -1043,7 +1045,7 @@
           <a:p>
             <a:fld id="{8161FC19-448B-45B3-ABDC-99AC11CB222E}" type="datetimeFigureOut">
               <a:rPr lang="es-ES" smtClean="0"/>
-              <a:t>07/07/2018</a:t>
+              <a:t>08/07/2018</a:t>
             </a:fld>
             <a:endParaRPr lang="es-ES" dirty="0"/>
           </a:p>
@@ -1272,7 +1274,7 @@
           <a:p>
             <a:fld id="{8161FC19-448B-45B3-ABDC-99AC11CB222E}" type="datetimeFigureOut">
               <a:rPr lang="es-ES" smtClean="0"/>
-              <a:t>07/07/2018</a:t>
+              <a:t>08/07/2018</a:t>
             </a:fld>
             <a:endParaRPr lang="es-ES" dirty="0"/>
           </a:p>
@@ -1636,7 +1638,7 @@
           <a:p>
             <a:fld id="{8161FC19-448B-45B3-ABDC-99AC11CB222E}" type="datetimeFigureOut">
               <a:rPr lang="es-ES" smtClean="0"/>
-              <a:t>07/07/2018</a:t>
+              <a:t>08/07/2018</a:t>
             </a:fld>
             <a:endParaRPr lang="es-ES" dirty="0"/>
           </a:p>
@@ -1753,7 +1755,7 @@
           <a:p>
             <a:fld id="{8161FC19-448B-45B3-ABDC-99AC11CB222E}" type="datetimeFigureOut">
               <a:rPr lang="es-ES" smtClean="0"/>
-              <a:t>07/07/2018</a:t>
+              <a:t>08/07/2018</a:t>
             </a:fld>
             <a:endParaRPr lang="es-ES" dirty="0"/>
           </a:p>
@@ -1848,7 +1850,7 @@
           <a:p>
             <a:fld id="{8161FC19-448B-45B3-ABDC-99AC11CB222E}" type="datetimeFigureOut">
               <a:rPr lang="es-ES" smtClean="0"/>
-              <a:t>07/07/2018</a:t>
+              <a:t>08/07/2018</a:t>
             </a:fld>
             <a:endParaRPr lang="es-ES" dirty="0"/>
           </a:p>
@@ -2123,7 +2125,7 @@
           <a:p>
             <a:fld id="{8161FC19-448B-45B3-ABDC-99AC11CB222E}" type="datetimeFigureOut">
               <a:rPr lang="es-ES" smtClean="0"/>
-              <a:t>07/07/2018</a:t>
+              <a:t>08/07/2018</a:t>
             </a:fld>
             <a:endParaRPr lang="es-ES" dirty="0"/>
           </a:p>
@@ -2375,7 +2377,7 @@
           <a:p>
             <a:fld id="{8161FC19-448B-45B3-ABDC-99AC11CB222E}" type="datetimeFigureOut">
               <a:rPr lang="es-ES" smtClean="0"/>
-              <a:t>07/07/2018</a:t>
+              <a:t>08/07/2018</a:t>
             </a:fld>
             <a:endParaRPr lang="es-ES" dirty="0"/>
           </a:p>
@@ -2586,7 +2588,7 @@
           <a:p>
             <a:fld id="{8161FC19-448B-45B3-ABDC-99AC11CB222E}" type="datetimeFigureOut">
               <a:rPr lang="es-ES" smtClean="0"/>
-              <a:t>07/07/2018</a:t>
+              <a:t>08/07/2018</a:t>
             </a:fld>
             <a:endParaRPr lang="es-ES" dirty="0"/>
           </a:p>
@@ -8620,7 +8622,7 @@
           <p:nvPr>
             <p:extLst>
               <p:ext uri="{D42A27DB-BD31-4B8C-83A1-F6EECF244321}">
-                <p14:modId xmlns:p14="http://schemas.microsoft.com/office/powerpoint/2010/main" val="3565933156"/>
+                <p14:modId xmlns:p14="http://schemas.microsoft.com/office/powerpoint/2010/main" val="3081160649"/>
               </p:ext>
             </p:extLst>
           </p:nvPr>
@@ -8663,7 +8665,7 @@
                       <a:pPr algn="ctr"/>
                       <a:r>
                         <a:rPr lang="es-ES" sz="2800" dirty="0" smtClean="0"/>
-                        <a:t>C</a:t>
+                        <a:t>L</a:t>
                       </a:r>
                       <a:endParaRPr lang="es-ES" sz="2800" dirty="0"/>
                     </a:p>
@@ -8678,7 +8680,7 @@
                       <a:pPr algn="ctr"/>
                       <a:r>
                         <a:rPr lang="es-ES" sz="2800" dirty="0" smtClean="0"/>
-                        <a:t>L</a:t>
+                        <a:t>C</a:t>
                       </a:r>
                       <a:endParaRPr lang="es-ES" sz="2800" dirty="0"/>
                     </a:p>
@@ -9655,8 +9657,8 @@
         </p:nvSpPr>
         <p:spPr>
           <a:xfrm>
-            <a:off x="9103057" y="2631618"/>
-            <a:ext cx="372218" cy="369332"/>
+            <a:off x="9099851" y="2400578"/>
+            <a:ext cx="1260281" cy="369332"/>
           </a:xfrm>
           <a:prstGeom prst="rect">
             <a:avLst/>
@@ -9671,7 +9673,7 @@
           <a:p>
             <a:r>
               <a:rPr lang="es-ES" dirty="0" smtClean="0"/>
-              <a:t>1)</a:t>
+              <a:t>Escenario 1</a:t>
             </a:r>
             <a:endParaRPr lang="es-ES" dirty="0"/>
           </a:p>
@@ -9685,8 +9687,8 @@
         </p:nvSpPr>
         <p:spPr>
           <a:xfrm>
-            <a:off x="9103057" y="5294566"/>
-            <a:ext cx="372218" cy="369332"/>
+            <a:off x="9103057" y="5130591"/>
+            <a:ext cx="1257075" cy="369332"/>
           </a:xfrm>
           <a:prstGeom prst="rect">
             <a:avLst/>
@@ -9700,14 +9702,50 @@
           <a:lstStyle/>
           <a:p>
             <a:r>
-              <a:rPr lang="es-ES" dirty="0"/>
-              <a:t>2</a:t>
-            </a:r>
-            <a:r>
               <a:rPr lang="es-ES" dirty="0" smtClean="0"/>
-              <a:t>)</a:t>
+              <a:t>Escenario 2</a:t>
             </a:r>
             <a:endParaRPr lang="es-ES" dirty="0"/>
+          </a:p>
+        </p:txBody>
+      </p:sp>
+      <p:sp>
+        <p:nvSpPr>
+          <p:cNvPr id="18" name="Elipse 17"/>
+          <p:cNvSpPr/>
+          <p:nvPr/>
+        </p:nvSpPr>
+        <p:spPr>
+          <a:xfrm>
+            <a:off x="6369521" y="5159789"/>
+            <a:ext cx="2310021" cy="310936"/>
+          </a:xfrm>
+          <a:prstGeom prst="ellipse">
+            <a:avLst/>
+          </a:prstGeom>
+          <a:noFill/>
+          <a:ln w="38100"/>
+        </p:spPr>
+        <p:style>
+          <a:lnRef idx="2">
+            <a:schemeClr val="accent6"/>
+          </a:lnRef>
+          <a:fillRef idx="1">
+            <a:schemeClr val="lt1"/>
+          </a:fillRef>
+          <a:effectRef idx="0">
+            <a:schemeClr val="accent6"/>
+          </a:effectRef>
+          <a:fontRef idx="minor">
+            <a:schemeClr val="dk1"/>
+          </a:fontRef>
+        </p:style>
+        <p:txBody>
+          <a:bodyPr rtlCol="0" anchor="ctr"/>
+          <a:lstStyle/>
+          <a:p>
+            <a:pPr algn="ctr"/>
+            <a:endParaRPr lang="es-ES"/>
           </a:p>
         </p:txBody>
       </p:sp>
@@ -9726,26 +9764,20 @@
             <a:avLst/>
           </a:prstGeom>
           <a:noFill/>
-          <a:ln>
-            <a:solidFill>
-              <a:schemeClr val="accent6"/>
-            </a:solidFill>
-          </a:ln>
+          <a:ln w="38100"/>
         </p:spPr>
         <p:style>
           <a:lnRef idx="2">
-            <a:schemeClr val="accent1">
-              <a:shade val="50000"/>
-            </a:schemeClr>
+            <a:schemeClr val="accent6"/>
           </a:lnRef>
           <a:fillRef idx="1">
-            <a:schemeClr val="accent1"/>
+            <a:schemeClr val="lt1"/>
           </a:fillRef>
           <a:effectRef idx="0">
-            <a:schemeClr val="accent1"/>
+            <a:schemeClr val="accent6"/>
           </a:effectRef>
           <a:fontRef idx="minor">
-            <a:schemeClr val="lt1"/>
+            <a:schemeClr val="dk1"/>
           </a:fontRef>
         </p:style>
         <p:txBody>
@@ -9772,26 +9804,20 @@
             <a:avLst/>
           </a:prstGeom>
           <a:noFill/>
-          <a:ln>
-            <a:solidFill>
-              <a:schemeClr val="accent6"/>
-            </a:solidFill>
-          </a:ln>
+          <a:ln w="38100"/>
         </p:spPr>
         <p:style>
           <a:lnRef idx="2">
-            <a:schemeClr val="accent1">
-              <a:shade val="50000"/>
-            </a:schemeClr>
+            <a:schemeClr val="accent6"/>
           </a:lnRef>
           <a:fillRef idx="1">
-            <a:schemeClr val="accent1"/>
+            <a:schemeClr val="lt1"/>
           </a:fillRef>
           <a:effectRef idx="0">
-            <a:schemeClr val="accent1"/>
+            <a:schemeClr val="accent6"/>
           </a:effectRef>
           <a:fontRef idx="minor">
-            <a:schemeClr val="lt1"/>
+            <a:schemeClr val="dk1"/>
           </a:fontRef>
         </p:style>
         <p:txBody>
@@ -9818,72 +9844,20 @@
             <a:avLst/>
           </a:prstGeom>
           <a:noFill/>
-          <a:ln>
-            <a:solidFill>
-              <a:schemeClr val="accent6"/>
-            </a:solidFill>
-          </a:ln>
+          <a:ln w="38100"/>
         </p:spPr>
         <p:style>
           <a:lnRef idx="2">
-            <a:schemeClr val="accent1">
-              <a:shade val="50000"/>
-            </a:schemeClr>
+            <a:schemeClr val="accent6"/>
           </a:lnRef>
           <a:fillRef idx="1">
-            <a:schemeClr val="accent1"/>
+            <a:schemeClr val="lt1"/>
           </a:fillRef>
           <a:effectRef idx="0">
-            <a:schemeClr val="accent1"/>
+            <a:schemeClr val="accent6"/>
           </a:effectRef>
           <a:fontRef idx="minor">
-            <a:schemeClr val="lt1"/>
-          </a:fontRef>
-        </p:style>
-        <p:txBody>
-          <a:bodyPr rtlCol="0" anchor="ctr"/>
-          <a:lstStyle/>
-          <a:p>
-            <a:pPr algn="ctr"/>
-            <a:endParaRPr lang="es-ES"/>
-          </a:p>
-        </p:txBody>
-      </p:sp>
-      <p:sp>
-        <p:nvSpPr>
-          <p:cNvPr id="18" name="Elipse 17"/>
-          <p:cNvSpPr/>
-          <p:nvPr/>
-        </p:nvSpPr>
-        <p:spPr>
-          <a:xfrm>
-            <a:off x="6369521" y="5159789"/>
-            <a:ext cx="2310021" cy="310936"/>
-          </a:xfrm>
-          <a:prstGeom prst="ellipse">
-            <a:avLst/>
-          </a:prstGeom>
-          <a:noFill/>
-          <a:ln>
-            <a:solidFill>
-              <a:schemeClr val="accent6"/>
-            </a:solidFill>
-          </a:ln>
-        </p:spPr>
-        <p:style>
-          <a:lnRef idx="2">
-            <a:schemeClr val="accent1">
-              <a:shade val="50000"/>
-            </a:schemeClr>
-          </a:lnRef>
-          <a:fillRef idx="1">
-            <a:schemeClr val="accent1"/>
-          </a:fillRef>
-          <a:effectRef idx="0">
-            <a:schemeClr val="accent1"/>
-          </a:effectRef>
-          <a:fontRef idx="minor">
-            <a:schemeClr val="lt1"/>
+            <a:schemeClr val="dk1"/>
           </a:fontRef>
         </p:style>
         <p:txBody>
@@ -10061,10 +10035,10 @@
       </p:par>
     </p:tnLst>
     <p:bldLst>
+      <p:bldP spid="18" grpId="0" animBg="1"/>
       <p:bldP spid="15" grpId="0" animBg="1"/>
       <p:bldP spid="16" grpId="0" animBg="1"/>
       <p:bldP spid="17" grpId="0" animBg="1"/>
-      <p:bldP spid="18" grpId="0" animBg="1"/>
     </p:bldLst>
   </p:timing>
 </p:sld>
@@ -10305,7 +10279,7 @@
         </p:blipFill>
         <p:spPr>
           <a:xfrm>
-            <a:off x="140174" y="3836556"/>
+            <a:off x="158818" y="3836556"/>
             <a:ext cx="8577364" cy="2860649"/>
           </a:xfrm>
           <a:prstGeom prst="rect">
@@ -10313,66 +10287,36 @@
           </a:prstGeom>
         </p:spPr>
       </p:pic>
-      <p:pic>
-        <p:nvPicPr>
-          <p:cNvPr id="13" name="Imagen 12"/>
-          <p:cNvPicPr>
-            <a:picLocks noChangeAspect="1"/>
-          </p:cNvPicPr>
+      <p:sp>
+        <p:nvSpPr>
+          <p:cNvPr id="3" name="CuadroTexto 2"/>
+          <p:cNvSpPr txBox="1"/>
           <p:nvPr/>
-        </p:nvPicPr>
-        <p:blipFill>
-          <a:blip r:embed="rId7">
-            <a:extLst>
-              <a:ext uri="{28A0092B-C50C-407E-A947-70E740481C1C}">
-                <a14:useLocalDpi xmlns:a14="http://schemas.microsoft.com/office/drawing/2010/main" val="0"/>
-              </a:ext>
-            </a:extLst>
-          </a:blip>
-          <a:stretch>
-            <a:fillRect/>
-          </a:stretch>
-        </p:blipFill>
+        </p:nvSpPr>
         <p:spPr>
           <a:xfrm>
-            <a:off x="8736182" y="1344158"/>
-            <a:ext cx="3003507" cy="2761794"/>
+            <a:off x="9131300" y="3530600"/>
+            <a:ext cx="1257075" cy="369332"/>
           </a:xfrm>
           <a:prstGeom prst="rect">
             <a:avLst/>
           </a:prstGeom>
-        </p:spPr>
-      </p:pic>
-      <p:pic>
-        <p:nvPicPr>
-          <p:cNvPr id="12" name="Imagen 11"/>
-          <p:cNvPicPr>
-            <a:picLocks noChangeAspect="1"/>
-          </p:cNvPicPr>
-          <p:nvPr/>
-        </p:nvPicPr>
-        <p:blipFill>
-          <a:blip r:embed="rId8">
-            <a:extLst>
-              <a:ext uri="{28A0092B-C50C-407E-A947-70E740481C1C}">
-                <a14:useLocalDpi xmlns:a14="http://schemas.microsoft.com/office/drawing/2010/main" val="0"/>
-              </a:ext>
-            </a:extLst>
-          </a:blip>
-          <a:stretch>
-            <a:fillRect/>
-          </a:stretch>
-        </p:blipFill>
-        <p:spPr>
-          <a:xfrm>
-            <a:off x="8736183" y="3818865"/>
-            <a:ext cx="3003507" cy="2243797"/>
-          </a:xfrm>
-          <a:prstGeom prst="rect">
-            <a:avLst/>
-          </a:prstGeom>
-        </p:spPr>
-      </p:pic>
+          <a:noFill/>
+        </p:spPr>
+        <p:txBody>
+          <a:bodyPr wrap="none" rtlCol="0">
+            <a:spAutoFit/>
+          </a:bodyPr>
+          <a:lstStyle/>
+          <a:p>
+            <a:r>
+              <a:rPr lang="es-ES" dirty="0" smtClean="0"/>
+              <a:t>Escenario 3</a:t>
+            </a:r>
+            <a:endParaRPr lang="es-ES" dirty="0"/>
+          </a:p>
+        </p:txBody>
+      </p:sp>
     </p:spTree>
     <p:extLst>
       <p:ext uri="{BB962C8B-B14F-4D97-AF65-F5344CB8AC3E}">
@@ -10386,102 +10330,7 @@
   <p:timing>
     <p:tnLst>
       <p:par>
-        <p:cTn id="1" dur="indefinite" restart="never" nodeType="tmRoot">
-          <p:childTnLst>
-            <p:seq concurrent="1" nextAc="seek">
-              <p:cTn id="2" dur="indefinite" nodeType="mainSeq">
-                <p:childTnLst>
-                  <p:par>
-                    <p:cTn id="3" fill="hold">
-                      <p:stCondLst>
-                        <p:cond delay="indefinite"/>
-                      </p:stCondLst>
-                      <p:childTnLst>
-                        <p:par>
-                          <p:cTn id="4" fill="hold">
-                            <p:stCondLst>
-                              <p:cond delay="0"/>
-                            </p:stCondLst>
-                            <p:childTnLst>
-                              <p:par>
-                                <p:cTn id="5" presetID="1" presetClass="entr" presetSubtype="0" fill="hold" nodeType="clickEffect">
-                                  <p:stCondLst>
-                                    <p:cond delay="0"/>
-                                  </p:stCondLst>
-                                  <p:childTnLst>
-                                    <p:set>
-                                      <p:cBhvr>
-                                        <p:cTn id="6" dur="1" fill="hold">
-                                          <p:stCondLst>
-                                            <p:cond delay="0"/>
-                                          </p:stCondLst>
-                                        </p:cTn>
-                                        <p:tgtEl>
-                                          <p:spTgt spid="13"/>
-                                        </p:tgtEl>
-                                        <p:attrNameLst>
-                                          <p:attrName>style.visibility</p:attrName>
-                                        </p:attrNameLst>
-                                      </p:cBhvr>
-                                      <p:to>
-                                        <p:strVal val="visible"/>
-                                      </p:to>
-                                    </p:set>
-                                  </p:childTnLst>
-                                </p:cTn>
-                              </p:par>
-                              <p:par>
-                                <p:cTn id="7" presetID="1" presetClass="entr" presetSubtype="0" fill="hold" nodeType="withEffect">
-                                  <p:stCondLst>
-                                    <p:cond delay="0"/>
-                                  </p:stCondLst>
-                                  <p:childTnLst>
-                                    <p:set>
-                                      <p:cBhvr>
-                                        <p:cTn id="8" dur="1" fill="hold">
-                                          <p:stCondLst>
-                                            <p:cond delay="0"/>
-                                          </p:stCondLst>
-                                        </p:cTn>
-                                        <p:tgtEl>
-                                          <p:spTgt spid="12"/>
-                                        </p:tgtEl>
-                                        <p:attrNameLst>
-                                          <p:attrName>style.visibility</p:attrName>
-                                        </p:attrNameLst>
-                                      </p:cBhvr>
-                                      <p:to>
-                                        <p:strVal val="visible"/>
-                                      </p:to>
-                                    </p:set>
-                                  </p:childTnLst>
-                                </p:cTn>
-                              </p:par>
-                            </p:childTnLst>
-                          </p:cTn>
-                        </p:par>
-                      </p:childTnLst>
-                    </p:cTn>
-                  </p:par>
-                </p:childTnLst>
-              </p:cTn>
-              <p:prevCondLst>
-                <p:cond evt="onPrev" delay="0">
-                  <p:tgtEl>
-                    <p:sldTgt/>
-                  </p:tgtEl>
-                </p:cond>
-              </p:prevCondLst>
-              <p:nextCondLst>
-                <p:cond evt="onNext" delay="0">
-                  <p:tgtEl>
-                    <p:sldTgt/>
-                  </p:tgtEl>
-                </p:cond>
-              </p:nextCondLst>
-            </p:seq>
-          </p:childTnLst>
-        </p:cTn>
+        <p:cTn id="1" dur="indefinite" restart="never" nodeType="tmRoot"/>
       </p:par>
     </p:tnLst>
   </p:timing>
@@ -11000,10 +10849,161 @@
           </a:extLst>
         </p:spPr>
       </p:pic>
+      <p:pic>
+        <p:nvPicPr>
+          <p:cNvPr id="13" name="Imagen 12"/>
+          <p:cNvPicPr>
+            <a:picLocks noChangeAspect="1"/>
+          </p:cNvPicPr>
+          <p:nvPr/>
+        </p:nvPicPr>
+        <p:blipFill>
+          <a:blip r:embed="rId5">
+            <a:extLst>
+              <a:ext uri="{28A0092B-C50C-407E-A947-70E740481C1C}">
+                <a14:useLocalDpi xmlns:a14="http://schemas.microsoft.com/office/drawing/2010/main" val="0"/>
+              </a:ext>
+            </a:extLst>
+          </a:blip>
+          <a:stretch>
+            <a:fillRect/>
+          </a:stretch>
+        </p:blipFill>
+        <p:spPr>
+          <a:xfrm>
+            <a:off x="6373563" y="1372186"/>
+            <a:ext cx="3173883" cy="2918459"/>
+          </a:xfrm>
+          <a:prstGeom prst="rect">
+            <a:avLst/>
+          </a:prstGeom>
+        </p:spPr>
+      </p:pic>
+      <p:pic>
+        <p:nvPicPr>
+          <p:cNvPr id="12" name="Imagen 11"/>
+          <p:cNvPicPr>
+            <a:picLocks noChangeAspect="1"/>
+          </p:cNvPicPr>
+          <p:nvPr/>
+        </p:nvPicPr>
+        <p:blipFill>
+          <a:blip r:embed="rId6">
+            <a:extLst>
+              <a:ext uri="{28A0092B-C50C-407E-A947-70E740481C1C}">
+                <a14:useLocalDpi xmlns:a14="http://schemas.microsoft.com/office/drawing/2010/main" val="0"/>
+              </a:ext>
+            </a:extLst>
+          </a:blip>
+          <a:stretch>
+            <a:fillRect/>
+          </a:stretch>
+        </p:blipFill>
+        <p:spPr>
+          <a:xfrm>
+            <a:off x="6286049" y="4313963"/>
+            <a:ext cx="3348909" cy="2501833"/>
+          </a:xfrm>
+          <a:prstGeom prst="rect">
+            <a:avLst/>
+          </a:prstGeom>
+        </p:spPr>
+      </p:pic>
+      <p:sp>
+        <p:nvSpPr>
+          <p:cNvPr id="8" name="CuadroTexto 7"/>
+          <p:cNvSpPr txBox="1"/>
+          <p:nvPr/>
+        </p:nvSpPr>
+        <p:spPr>
+          <a:xfrm>
+            <a:off x="4251501" y="3475503"/>
+            <a:ext cx="1958348" cy="646331"/>
+          </a:xfrm>
+          <a:prstGeom prst="rect">
+            <a:avLst/>
+          </a:prstGeom>
+          <a:noFill/>
+        </p:spPr>
+        <p:txBody>
+          <a:bodyPr wrap="square" rtlCol="0">
+            <a:spAutoFit/>
+          </a:bodyPr>
+          <a:lstStyle/>
+          <a:p>
+            <a:pPr algn="ctr"/>
+            <a:r>
+              <a:rPr lang="es-ES" dirty="0" smtClean="0"/>
+              <a:t>Comparativa entre escenario 3 y 4 </a:t>
+            </a:r>
+            <a:endParaRPr lang="es-ES" dirty="0"/>
+          </a:p>
+        </p:txBody>
+      </p:sp>
+      <p:pic>
+        <p:nvPicPr>
+          <p:cNvPr id="9" name="Imagen 8"/>
+          <p:cNvPicPr>
+            <a:picLocks noChangeAspect="1"/>
+          </p:cNvPicPr>
+          <p:nvPr/>
+        </p:nvPicPr>
+        <p:blipFill>
+          <a:blip r:embed="rId7">
+            <a:extLst>
+              <a:ext uri="{28A0092B-C50C-407E-A947-70E740481C1C}">
+                <a14:useLocalDpi xmlns:a14="http://schemas.microsoft.com/office/drawing/2010/main" val="0"/>
+              </a:ext>
+            </a:extLst>
+          </a:blip>
+          <a:stretch>
+            <a:fillRect/>
+          </a:stretch>
+        </p:blipFill>
+        <p:spPr>
+          <a:xfrm>
+            <a:off x="751658" y="1372187"/>
+            <a:ext cx="3233744" cy="2958224"/>
+          </a:xfrm>
+          <a:prstGeom prst="rect">
+            <a:avLst/>
+          </a:prstGeom>
+        </p:spPr>
+      </p:pic>
+      <p:pic>
+        <p:nvPicPr>
+          <p:cNvPr id="15" name="Imagen 14"/>
+          <p:cNvPicPr>
+            <a:picLocks noChangeAspect="1"/>
+          </p:cNvPicPr>
+          <p:nvPr/>
+        </p:nvPicPr>
+        <p:blipFill>
+          <a:blip r:embed="rId8">
+            <a:extLst>
+              <a:ext uri="{28A0092B-C50C-407E-A947-70E740481C1C}">
+                <a14:useLocalDpi xmlns:a14="http://schemas.microsoft.com/office/drawing/2010/main" val="0"/>
+              </a:ext>
+            </a:extLst>
+          </a:blip>
+          <a:stretch>
+            <a:fillRect/>
+          </a:stretch>
+        </p:blipFill>
+        <p:spPr>
+          <a:xfrm>
+            <a:off x="751657" y="4353549"/>
+            <a:ext cx="3157545" cy="2462247"/>
+          </a:xfrm>
+          <a:prstGeom prst="rect">
+            <a:avLst/>
+          </a:prstGeom>
+        </p:spPr>
+      </p:pic>
     </p:spTree>
     <p:extLst>
       <p:ext uri="{BB962C8B-B14F-4D97-AF65-F5344CB8AC3E}">
-        <p14:creationId xmlns:p14="http://schemas.microsoft.com/office/powerpoint/2010/main" val="3525511416"/>
+        <p14:creationId xmlns:p14="http://schemas.microsoft.com/office/powerpoint/2010/main" val="573730534"/>
       </p:ext>
     </p:extLst>
   </p:cSld>
@@ -11063,7 +11063,7 @@
                   </a:schemeClr>
                 </a:solidFill>
               </a:rPr>
-              <a:t>Resultados segundo ensayo</a:t>
+              <a:t>Resultados primer ensayo</a:t>
             </a:r>
             <a:endParaRPr lang="es-ES" b="1" dirty="0">
               <a:solidFill>
@@ -11203,10 +11203,160 @@
           </a:extLst>
         </p:spPr>
       </p:pic>
+      <p:pic>
+        <p:nvPicPr>
+          <p:cNvPr id="3" name="Imagen 2"/>
+          <p:cNvPicPr>
+            <a:picLocks noChangeAspect="1"/>
+          </p:cNvPicPr>
+          <p:nvPr/>
+        </p:nvPicPr>
+        <p:blipFill>
+          <a:blip r:embed="rId5">
+            <a:extLst>
+              <a:ext uri="{28A0092B-C50C-407E-A947-70E740481C1C}">
+                <a14:useLocalDpi xmlns:a14="http://schemas.microsoft.com/office/drawing/2010/main" val="0"/>
+              </a:ext>
+            </a:extLst>
+          </a:blip>
+          <a:stretch>
+            <a:fillRect/>
+          </a:stretch>
+        </p:blipFill>
+        <p:spPr>
+          <a:xfrm>
+            <a:off x="145140" y="1284370"/>
+            <a:ext cx="8839203" cy="2947976"/>
+          </a:xfrm>
+          <a:prstGeom prst="rect">
+            <a:avLst/>
+          </a:prstGeom>
+        </p:spPr>
+      </p:pic>
+      <p:pic>
+        <p:nvPicPr>
+          <p:cNvPr id="8" name="Imagen 7"/>
+          <p:cNvPicPr>
+            <a:picLocks noChangeAspect="1"/>
+          </p:cNvPicPr>
+          <p:nvPr/>
+        </p:nvPicPr>
+        <p:blipFill>
+          <a:blip r:embed="rId6">
+            <a:extLst>
+              <a:ext uri="{28A0092B-C50C-407E-A947-70E740481C1C}">
+                <a14:useLocalDpi xmlns:a14="http://schemas.microsoft.com/office/drawing/2010/main" val="0"/>
+              </a:ext>
+            </a:extLst>
+          </a:blip>
+          <a:stretch>
+            <a:fillRect/>
+          </a:stretch>
+        </p:blipFill>
+        <p:spPr>
+          <a:xfrm>
+            <a:off x="3040616" y="3836556"/>
+            <a:ext cx="2997328" cy="2356352"/>
+          </a:xfrm>
+          <a:prstGeom prst="rect">
+            <a:avLst/>
+          </a:prstGeom>
+        </p:spPr>
+      </p:pic>
+      <p:pic>
+        <p:nvPicPr>
+          <p:cNvPr id="9" name="Imagen 8"/>
+          <p:cNvPicPr>
+            <a:picLocks noChangeAspect="1"/>
+          </p:cNvPicPr>
+          <p:nvPr/>
+        </p:nvPicPr>
+        <p:blipFill>
+          <a:blip r:embed="rId7">
+            <a:extLst>
+              <a:ext uri="{28A0092B-C50C-407E-A947-70E740481C1C}">
+                <a14:useLocalDpi xmlns:a14="http://schemas.microsoft.com/office/drawing/2010/main" val="0"/>
+              </a:ext>
+            </a:extLst>
+          </a:blip>
+          <a:stretch>
+            <a:fillRect/>
+          </a:stretch>
+        </p:blipFill>
+        <p:spPr>
+          <a:xfrm>
+            <a:off x="6037944" y="3836557"/>
+            <a:ext cx="2946399" cy="2355876"/>
+          </a:xfrm>
+          <a:prstGeom prst="rect">
+            <a:avLst/>
+          </a:prstGeom>
+        </p:spPr>
+      </p:pic>
+      <p:pic>
+        <p:nvPicPr>
+          <p:cNvPr id="10" name="Imagen 9"/>
+          <p:cNvPicPr>
+            <a:picLocks noChangeAspect="1"/>
+          </p:cNvPicPr>
+          <p:nvPr/>
+        </p:nvPicPr>
+        <p:blipFill>
+          <a:blip r:embed="rId8">
+            <a:extLst>
+              <a:ext uri="{28A0092B-C50C-407E-A947-70E740481C1C}">
+                <a14:useLocalDpi xmlns:a14="http://schemas.microsoft.com/office/drawing/2010/main" val="0"/>
+              </a:ext>
+            </a:extLst>
+          </a:blip>
+          <a:stretch>
+            <a:fillRect/>
+          </a:stretch>
+        </p:blipFill>
+        <p:spPr>
+          <a:xfrm>
+            <a:off x="140173" y="3836556"/>
+            <a:ext cx="2900442" cy="2354693"/>
+          </a:xfrm>
+          <a:prstGeom prst="rect">
+            <a:avLst/>
+          </a:prstGeom>
+        </p:spPr>
+      </p:pic>
+      <p:sp>
+        <p:nvSpPr>
+          <p:cNvPr id="14" name="CuadroTexto 13"/>
+          <p:cNvSpPr txBox="1"/>
+          <p:nvPr/>
+        </p:nvSpPr>
+        <p:spPr>
+          <a:xfrm>
+            <a:off x="9131300" y="3530600"/>
+            <a:ext cx="1257075" cy="369332"/>
+          </a:xfrm>
+          <a:prstGeom prst="rect">
+            <a:avLst/>
+          </a:prstGeom>
+          <a:noFill/>
+        </p:spPr>
+        <p:txBody>
+          <a:bodyPr wrap="none" rtlCol="0">
+            <a:spAutoFit/>
+          </a:bodyPr>
+          <a:lstStyle/>
+          <a:p>
+            <a:r>
+              <a:rPr lang="es-ES" dirty="0" smtClean="0"/>
+              <a:t>Escenario 6</a:t>
+            </a:r>
+            <a:endParaRPr lang="es-ES" dirty="0"/>
+          </a:p>
+        </p:txBody>
+      </p:sp>
     </p:spTree>
     <p:extLst>
       <p:ext uri="{BB962C8B-B14F-4D97-AF65-F5344CB8AC3E}">
-        <p14:creationId xmlns:p14="http://schemas.microsoft.com/office/powerpoint/2010/main" val="2533352451"/>
+        <p14:creationId xmlns:p14="http://schemas.microsoft.com/office/powerpoint/2010/main" val="3525511416"/>
       </p:ext>
     </p:extLst>
   </p:cSld>
@@ -11224,6 +11374,1408 @@
 </file>
 
 <file path=ppt/slides/slide22.xml><?xml version="1.0" encoding="utf-8"?>
+<p:sld xmlns:a="http://schemas.openxmlformats.org/drawingml/2006/main" xmlns:r="http://schemas.openxmlformats.org/officeDocument/2006/relationships" xmlns:p="http://schemas.openxmlformats.org/presentationml/2006/main">
+  <p:cSld>
+    <p:spTree>
+      <p:nvGrpSpPr>
+        <p:cNvPr id="1" name=""/>
+        <p:cNvGrpSpPr/>
+        <p:nvPr/>
+      </p:nvGrpSpPr>
+      <p:grpSpPr>
+        <a:xfrm>
+          <a:off x="0" y="0"/>
+          <a:ext cx="0" cy="0"/>
+          <a:chOff x="0" y="0"/>
+          <a:chExt cx="0" cy="0"/>
+        </a:xfrm>
+      </p:grpSpPr>
+      <p:sp>
+        <p:nvSpPr>
+          <p:cNvPr id="2" name="1 Título"/>
+          <p:cNvSpPr>
+            <a:spLocks noGrp="1"/>
+          </p:cNvSpPr>
+          <p:nvPr>
+            <p:ph type="title"/>
+          </p:nvPr>
+        </p:nvSpPr>
+        <p:spPr/>
+        <p:txBody>
+          <a:bodyPr>
+            <a:normAutofit/>
+          </a:bodyPr>
+          <a:lstStyle/>
+          <a:p>
+            <a:pPr algn="ctr"/>
+            <a:r>
+              <a:rPr lang="es-ES" b="1" dirty="0" smtClean="0">
+                <a:solidFill>
+                  <a:schemeClr val="accent1">
+                    <a:lumMod val="50000"/>
+                  </a:schemeClr>
+                </a:solidFill>
+              </a:rPr>
+              <a:t>Resultados primer ensayo</a:t>
+            </a:r>
+            <a:endParaRPr lang="es-ES" b="1" dirty="0">
+              <a:solidFill>
+                <a:schemeClr val="accent1">
+                  <a:lumMod val="50000"/>
+                </a:schemeClr>
+              </a:solidFill>
+            </a:endParaRPr>
+          </a:p>
+        </p:txBody>
+      </p:sp>
+      <p:pic>
+        <p:nvPicPr>
+          <p:cNvPr id="4" name="Picture 2" descr="Resultado de imagen de etsidi logo"/>
+          <p:cNvPicPr>
+            <a:picLocks noChangeAspect="1" noChangeArrowheads="1"/>
+          </p:cNvPicPr>
+          <p:nvPr/>
+        </p:nvPicPr>
+        <p:blipFill>
+          <a:blip r:embed="rId2" cstate="print">
+            <a:extLst>
+              <a:ext uri="{28A0092B-C50C-407E-A947-70E740481C1C}">
+                <a14:useLocalDpi xmlns:a14="http://schemas.microsoft.com/office/drawing/2010/main" val="0"/>
+              </a:ext>
+            </a:extLst>
+          </a:blip>
+          <a:srcRect/>
+          <a:stretch>
+            <a:fillRect/>
+          </a:stretch>
+        </p:blipFill>
+        <p:spPr bwMode="auto">
+          <a:xfrm>
+            <a:off x="10269415" y="286460"/>
+            <a:ext cx="1693789" cy="895227"/>
+          </a:xfrm>
+          <a:prstGeom prst="rect">
+            <a:avLst/>
+          </a:prstGeom>
+          <a:noFill/>
+          <a:extLst>
+            <a:ext uri="{909E8E84-426E-40DD-AFC4-6F175D3DCCD1}">
+              <a14:hiddenFill xmlns:a14="http://schemas.microsoft.com/office/drawing/2010/main">
+                <a:solidFill>
+                  <a:srgbClr val="FFFFFF"/>
+                </a:solidFill>
+              </a14:hiddenFill>
+            </a:ext>
+          </a:extLst>
+        </p:spPr>
+      </p:pic>
+      <p:pic>
+        <p:nvPicPr>
+          <p:cNvPr id="5" name="Picture 2" descr="Macintosh HD en Idril:Users:barrientos:DATOS:Modelos:Logos:UPM:EscUpmPolit.jpg"/>
+          <p:cNvPicPr/>
+          <p:nvPr/>
+        </p:nvPicPr>
+        <p:blipFill>
+          <a:blip r:embed="rId3">
+            <a:extLst>
+              <a:ext uri="{28A0092B-C50C-407E-A947-70E740481C1C}">
+                <a14:useLocalDpi xmlns:a14="http://schemas.microsoft.com/office/drawing/2010/main" val="0"/>
+              </a:ext>
+            </a:extLst>
+          </a:blip>
+          <a:srcRect/>
+          <a:stretch>
+            <a:fillRect/>
+          </a:stretch>
+        </p:blipFill>
+        <p:spPr bwMode="auto">
+          <a:xfrm>
+            <a:off x="143705" y="131712"/>
+            <a:ext cx="1417125" cy="1181686"/>
+          </a:xfrm>
+          <a:prstGeom prst="rect">
+            <a:avLst/>
+          </a:prstGeom>
+          <a:noFill/>
+          <a:ln>
+            <a:noFill/>
+          </a:ln>
+        </p:spPr>
+      </p:pic>
+      <p:pic>
+        <p:nvPicPr>
+          <p:cNvPr id="7" name="Image 6" descr="image011"/>
+          <p:cNvPicPr>
+            <a:picLocks noChangeAspect="1" noChangeArrowheads="1"/>
+          </p:cNvPicPr>
+          <p:nvPr/>
+        </p:nvPicPr>
+        <p:blipFill>
+          <a:blip r:embed="rId4">
+            <a:extLst>
+              <a:ext uri="{28A0092B-C50C-407E-A947-70E740481C1C}">
+                <a14:useLocalDpi xmlns:a14="http://schemas.microsoft.com/office/drawing/2010/main" val="0"/>
+              </a:ext>
+            </a:extLst>
+          </a:blip>
+          <a:srcRect/>
+          <a:stretch>
+            <a:fillRect/>
+          </a:stretch>
+        </p:blipFill>
+        <p:spPr bwMode="auto">
+          <a:xfrm>
+            <a:off x="9845799" y="6062662"/>
+            <a:ext cx="2117405" cy="452437"/>
+          </a:xfrm>
+          <a:prstGeom prst="rect">
+            <a:avLst/>
+          </a:prstGeom>
+          <a:noFill/>
+          <a:ln>
+            <a:noFill/>
+          </a:ln>
+          <a:extLst>
+            <a:ext uri="{909E8E84-426E-40DD-AFC4-6F175D3DCCD1}">
+              <a14:hiddenFill xmlns:a14="http://schemas.microsoft.com/office/drawing/2010/main">
+                <a:solidFill>
+                  <a:srgbClr val="FFFFFF"/>
+                </a:solidFill>
+              </a14:hiddenFill>
+            </a:ext>
+            <a:ext uri="{91240B29-F687-4F45-9708-019B960494DF}">
+              <a14:hiddenLine xmlns:a14="http://schemas.microsoft.com/office/drawing/2010/main" w="9525">
+                <a:solidFill>
+                  <a:srgbClr val="000000"/>
+                </a:solidFill>
+                <a:miter lim="800000"/>
+                <a:headEnd/>
+                <a:tailEnd/>
+              </a14:hiddenLine>
+            </a:ext>
+          </a:extLst>
+        </p:spPr>
+      </p:pic>
+      <p:pic>
+        <p:nvPicPr>
+          <p:cNvPr id="8" name="Imagen 7"/>
+          <p:cNvPicPr>
+            <a:picLocks noChangeAspect="1"/>
+          </p:cNvPicPr>
+          <p:nvPr/>
+        </p:nvPicPr>
+        <p:blipFill>
+          <a:blip r:embed="rId5">
+            <a:extLst>
+              <a:ext uri="{28A0092B-C50C-407E-A947-70E740481C1C}">
+                <a14:useLocalDpi xmlns:a14="http://schemas.microsoft.com/office/drawing/2010/main" val="0"/>
+              </a:ext>
+            </a:extLst>
+          </a:blip>
+          <a:stretch>
+            <a:fillRect/>
+          </a:stretch>
+        </p:blipFill>
+        <p:spPr>
+          <a:xfrm>
+            <a:off x="546100" y="4245072"/>
+            <a:ext cx="3323698" cy="2612928"/>
+          </a:xfrm>
+          <a:prstGeom prst="rect">
+            <a:avLst/>
+          </a:prstGeom>
+        </p:spPr>
+      </p:pic>
+      <p:pic>
+        <p:nvPicPr>
+          <p:cNvPr id="12" name="Imagen 11"/>
+          <p:cNvPicPr>
+            <a:picLocks noChangeAspect="1"/>
+          </p:cNvPicPr>
+          <p:nvPr/>
+        </p:nvPicPr>
+        <p:blipFill>
+          <a:blip r:embed="rId6">
+            <a:extLst>
+              <a:ext uri="{28A0092B-C50C-407E-A947-70E740481C1C}">
+                <a14:useLocalDpi xmlns:a14="http://schemas.microsoft.com/office/drawing/2010/main" val="0"/>
+              </a:ext>
+            </a:extLst>
+          </a:blip>
+          <a:stretch>
+            <a:fillRect/>
+          </a:stretch>
+        </p:blipFill>
+        <p:spPr>
+          <a:xfrm>
+            <a:off x="6701435" y="1319334"/>
+            <a:ext cx="3144364" cy="2894512"/>
+          </a:xfrm>
+          <a:prstGeom prst="rect">
+            <a:avLst/>
+          </a:prstGeom>
+        </p:spPr>
+      </p:pic>
+      <p:pic>
+        <p:nvPicPr>
+          <p:cNvPr id="13" name="Imagen 12"/>
+          <p:cNvPicPr>
+            <a:picLocks noChangeAspect="1"/>
+          </p:cNvPicPr>
+          <p:nvPr/>
+        </p:nvPicPr>
+        <p:blipFill>
+          <a:blip r:embed="rId5">
+            <a:extLst>
+              <a:ext uri="{28A0092B-C50C-407E-A947-70E740481C1C}">
+                <a14:useLocalDpi xmlns:a14="http://schemas.microsoft.com/office/drawing/2010/main" val="0"/>
+              </a:ext>
+            </a:extLst>
+          </a:blip>
+          <a:stretch>
+            <a:fillRect/>
+          </a:stretch>
+        </p:blipFill>
+        <p:spPr>
+          <a:xfrm>
+            <a:off x="6597991" y="4286594"/>
+            <a:ext cx="3247808" cy="2458292"/>
+          </a:xfrm>
+          <a:prstGeom prst="rect">
+            <a:avLst/>
+          </a:prstGeom>
+        </p:spPr>
+      </p:pic>
+      <p:pic>
+        <p:nvPicPr>
+          <p:cNvPr id="11" name="Imagen 10"/>
+          <p:cNvPicPr>
+            <a:picLocks noChangeAspect="1"/>
+          </p:cNvPicPr>
+          <p:nvPr/>
+        </p:nvPicPr>
+        <p:blipFill>
+          <a:blip r:embed="rId7">
+            <a:extLst>
+              <a:ext uri="{28A0092B-C50C-407E-A947-70E740481C1C}">
+                <a14:useLocalDpi xmlns:a14="http://schemas.microsoft.com/office/drawing/2010/main" val="0"/>
+              </a:ext>
+            </a:extLst>
+          </a:blip>
+          <a:stretch>
+            <a:fillRect/>
+          </a:stretch>
+        </p:blipFill>
+        <p:spPr>
+          <a:xfrm>
+            <a:off x="546100" y="1363360"/>
+            <a:ext cx="3340100" cy="2904434"/>
+          </a:xfrm>
+          <a:prstGeom prst="rect">
+            <a:avLst/>
+          </a:prstGeom>
+        </p:spPr>
+      </p:pic>
+      <p:sp>
+        <p:nvSpPr>
+          <p:cNvPr id="15" name="CuadroTexto 14"/>
+          <p:cNvSpPr txBox="1"/>
+          <p:nvPr/>
+        </p:nvSpPr>
+        <p:spPr>
+          <a:xfrm>
+            <a:off x="4251501" y="3475503"/>
+            <a:ext cx="1958348" cy="646331"/>
+          </a:xfrm>
+          <a:prstGeom prst="rect">
+            <a:avLst/>
+          </a:prstGeom>
+          <a:noFill/>
+        </p:spPr>
+        <p:txBody>
+          <a:bodyPr wrap="square" rtlCol="0">
+            <a:spAutoFit/>
+          </a:bodyPr>
+          <a:lstStyle/>
+          <a:p>
+            <a:pPr algn="ctr"/>
+            <a:r>
+              <a:rPr lang="es-ES" dirty="0" smtClean="0"/>
+              <a:t>Comparativa entre escenario 6 y 5 </a:t>
+            </a:r>
+            <a:endParaRPr lang="es-ES" dirty="0"/>
+          </a:p>
+        </p:txBody>
+      </p:sp>
+    </p:spTree>
+    <p:extLst>
+      <p:ext uri="{BB962C8B-B14F-4D97-AF65-F5344CB8AC3E}">
+        <p14:creationId xmlns:p14="http://schemas.microsoft.com/office/powerpoint/2010/main" val="3609041195"/>
+      </p:ext>
+    </p:extLst>
+  </p:cSld>
+  <p:clrMapOvr>
+    <a:masterClrMapping/>
+  </p:clrMapOvr>
+  <p:timing>
+    <p:tnLst>
+      <p:par>
+        <p:cTn id="1" dur="indefinite" restart="never" nodeType="tmRoot"/>
+      </p:par>
+    </p:tnLst>
+  </p:timing>
+</p:sld>
+</file>
+
+<file path=ppt/slides/slide23.xml><?xml version="1.0" encoding="utf-8"?>
+<p:sld xmlns:a="http://schemas.openxmlformats.org/drawingml/2006/main" xmlns:r="http://schemas.openxmlformats.org/officeDocument/2006/relationships" xmlns:p="http://schemas.openxmlformats.org/presentationml/2006/main">
+  <p:cSld>
+    <p:spTree>
+      <p:nvGrpSpPr>
+        <p:cNvPr id="1" name=""/>
+        <p:cNvGrpSpPr/>
+        <p:nvPr/>
+      </p:nvGrpSpPr>
+      <p:grpSpPr>
+        <a:xfrm>
+          <a:off x="0" y="0"/>
+          <a:ext cx="0" cy="0"/>
+          <a:chOff x="0" y="0"/>
+          <a:chExt cx="0" cy="0"/>
+        </a:xfrm>
+      </p:grpSpPr>
+      <p:sp>
+        <p:nvSpPr>
+          <p:cNvPr id="2" name="1 Título"/>
+          <p:cNvSpPr>
+            <a:spLocks noGrp="1"/>
+          </p:cNvSpPr>
+          <p:nvPr>
+            <p:ph type="title"/>
+          </p:nvPr>
+        </p:nvSpPr>
+        <p:spPr/>
+        <p:txBody>
+          <a:bodyPr>
+            <a:normAutofit/>
+          </a:bodyPr>
+          <a:lstStyle/>
+          <a:p>
+            <a:pPr algn="ctr"/>
+            <a:r>
+              <a:rPr lang="es-ES" b="1" dirty="0" smtClean="0">
+                <a:solidFill>
+                  <a:schemeClr val="accent1">
+                    <a:lumMod val="50000"/>
+                  </a:schemeClr>
+                </a:solidFill>
+              </a:rPr>
+              <a:t>Resultados segundo ensayo</a:t>
+            </a:r>
+            <a:endParaRPr lang="es-ES" b="1" dirty="0">
+              <a:solidFill>
+                <a:schemeClr val="accent1">
+                  <a:lumMod val="50000"/>
+                </a:schemeClr>
+              </a:solidFill>
+            </a:endParaRPr>
+          </a:p>
+        </p:txBody>
+      </p:sp>
+      <p:pic>
+        <p:nvPicPr>
+          <p:cNvPr id="4" name="Picture 2" descr="Resultado de imagen de etsidi logo"/>
+          <p:cNvPicPr>
+            <a:picLocks noChangeAspect="1" noChangeArrowheads="1"/>
+          </p:cNvPicPr>
+          <p:nvPr/>
+        </p:nvPicPr>
+        <p:blipFill>
+          <a:blip r:embed="rId2" cstate="print">
+            <a:extLst>
+              <a:ext uri="{28A0092B-C50C-407E-A947-70E740481C1C}">
+                <a14:useLocalDpi xmlns:a14="http://schemas.microsoft.com/office/drawing/2010/main" val="0"/>
+              </a:ext>
+            </a:extLst>
+          </a:blip>
+          <a:srcRect/>
+          <a:stretch>
+            <a:fillRect/>
+          </a:stretch>
+        </p:blipFill>
+        <p:spPr bwMode="auto">
+          <a:xfrm>
+            <a:off x="10269415" y="286460"/>
+            <a:ext cx="1693789" cy="895227"/>
+          </a:xfrm>
+          <a:prstGeom prst="rect">
+            <a:avLst/>
+          </a:prstGeom>
+          <a:noFill/>
+          <a:extLst>
+            <a:ext uri="{909E8E84-426E-40DD-AFC4-6F175D3DCCD1}">
+              <a14:hiddenFill xmlns:a14="http://schemas.microsoft.com/office/drawing/2010/main">
+                <a:solidFill>
+                  <a:srgbClr val="FFFFFF"/>
+                </a:solidFill>
+              </a14:hiddenFill>
+            </a:ext>
+          </a:extLst>
+        </p:spPr>
+      </p:pic>
+      <p:pic>
+        <p:nvPicPr>
+          <p:cNvPr id="5" name="Picture 2" descr="Macintosh HD en Idril:Users:barrientos:DATOS:Modelos:Logos:UPM:EscUpmPolit.jpg"/>
+          <p:cNvPicPr/>
+          <p:nvPr/>
+        </p:nvPicPr>
+        <p:blipFill>
+          <a:blip r:embed="rId3">
+            <a:extLst>
+              <a:ext uri="{28A0092B-C50C-407E-A947-70E740481C1C}">
+                <a14:useLocalDpi xmlns:a14="http://schemas.microsoft.com/office/drawing/2010/main" val="0"/>
+              </a:ext>
+            </a:extLst>
+          </a:blip>
+          <a:srcRect/>
+          <a:stretch>
+            <a:fillRect/>
+          </a:stretch>
+        </p:blipFill>
+        <p:spPr bwMode="auto">
+          <a:xfrm>
+            <a:off x="143705" y="131712"/>
+            <a:ext cx="1417125" cy="1181686"/>
+          </a:xfrm>
+          <a:prstGeom prst="rect">
+            <a:avLst/>
+          </a:prstGeom>
+          <a:noFill/>
+          <a:ln>
+            <a:noFill/>
+          </a:ln>
+        </p:spPr>
+      </p:pic>
+      <p:pic>
+        <p:nvPicPr>
+          <p:cNvPr id="7" name="Image 6" descr="image011"/>
+          <p:cNvPicPr>
+            <a:picLocks noChangeAspect="1" noChangeArrowheads="1"/>
+          </p:cNvPicPr>
+          <p:nvPr/>
+        </p:nvPicPr>
+        <p:blipFill>
+          <a:blip r:embed="rId4">
+            <a:extLst>
+              <a:ext uri="{28A0092B-C50C-407E-A947-70E740481C1C}">
+                <a14:useLocalDpi xmlns:a14="http://schemas.microsoft.com/office/drawing/2010/main" val="0"/>
+              </a:ext>
+            </a:extLst>
+          </a:blip>
+          <a:srcRect/>
+          <a:stretch>
+            <a:fillRect/>
+          </a:stretch>
+        </p:blipFill>
+        <p:spPr bwMode="auto">
+          <a:xfrm>
+            <a:off x="9845799" y="6062662"/>
+            <a:ext cx="2117405" cy="452437"/>
+          </a:xfrm>
+          <a:prstGeom prst="rect">
+            <a:avLst/>
+          </a:prstGeom>
+          <a:noFill/>
+          <a:ln>
+            <a:noFill/>
+          </a:ln>
+          <a:extLst>
+            <a:ext uri="{909E8E84-426E-40DD-AFC4-6F175D3DCCD1}">
+              <a14:hiddenFill xmlns:a14="http://schemas.microsoft.com/office/drawing/2010/main">
+                <a:solidFill>
+                  <a:srgbClr val="FFFFFF"/>
+                </a:solidFill>
+              </a14:hiddenFill>
+            </a:ext>
+            <a:ext uri="{91240B29-F687-4F45-9708-019B960494DF}">
+              <a14:hiddenLine xmlns:a14="http://schemas.microsoft.com/office/drawing/2010/main" w="9525">
+                <a:solidFill>
+                  <a:srgbClr val="000000"/>
+                </a:solidFill>
+                <a:miter lim="800000"/>
+                <a:headEnd/>
+                <a:tailEnd/>
+              </a14:hiddenLine>
+            </a:ext>
+          </a:extLst>
+        </p:spPr>
+      </p:pic>
+      <p:pic>
+        <p:nvPicPr>
+          <p:cNvPr id="3" name="Imagen 2"/>
+          <p:cNvPicPr>
+            <a:picLocks noChangeAspect="1"/>
+          </p:cNvPicPr>
+          <p:nvPr/>
+        </p:nvPicPr>
+        <p:blipFill>
+          <a:blip r:embed="rId5">
+            <a:extLst>
+              <a:ext uri="{28A0092B-C50C-407E-A947-70E740481C1C}">
+                <a14:useLocalDpi xmlns:a14="http://schemas.microsoft.com/office/drawing/2010/main" val="0"/>
+              </a:ext>
+            </a:extLst>
+          </a:blip>
+          <a:stretch>
+            <a:fillRect/>
+          </a:stretch>
+        </p:blipFill>
+        <p:spPr>
+          <a:xfrm>
+            <a:off x="143705" y="1712261"/>
+            <a:ext cx="5247161" cy="3459154"/>
+          </a:xfrm>
+          <a:prstGeom prst="rect">
+            <a:avLst/>
+          </a:prstGeom>
+        </p:spPr>
+      </p:pic>
+      <p:pic>
+        <p:nvPicPr>
+          <p:cNvPr id="6" name="Imagen 5"/>
+          <p:cNvPicPr>
+            <a:picLocks noChangeAspect="1"/>
+          </p:cNvPicPr>
+          <p:nvPr/>
+        </p:nvPicPr>
+        <p:blipFill>
+          <a:blip r:embed="rId6">
+            <a:extLst>
+              <a:ext uri="{28A0092B-C50C-407E-A947-70E740481C1C}">
+                <a14:useLocalDpi xmlns:a14="http://schemas.microsoft.com/office/drawing/2010/main" val="0"/>
+              </a:ext>
+            </a:extLst>
+          </a:blip>
+          <a:stretch>
+            <a:fillRect/>
+          </a:stretch>
+        </p:blipFill>
+        <p:spPr>
+          <a:xfrm>
+            <a:off x="5510987" y="1730020"/>
+            <a:ext cx="5257095" cy="3480726"/>
+          </a:xfrm>
+          <a:prstGeom prst="rect">
+            <a:avLst/>
+          </a:prstGeom>
+        </p:spPr>
+      </p:pic>
+      <p:sp>
+        <p:nvSpPr>
+          <p:cNvPr id="8" name="CuadroTexto 7"/>
+          <p:cNvSpPr txBox="1"/>
+          <p:nvPr/>
+        </p:nvSpPr>
+        <p:spPr>
+          <a:xfrm>
+            <a:off x="2388816" y="1584687"/>
+            <a:ext cx="1885453" cy="369332"/>
+          </a:xfrm>
+          <a:prstGeom prst="rect">
+            <a:avLst/>
+          </a:prstGeom>
+          <a:noFill/>
+        </p:spPr>
+        <p:txBody>
+          <a:bodyPr wrap="none" rtlCol="0">
+            <a:spAutoFit/>
+          </a:bodyPr>
+          <a:lstStyle/>
+          <a:p>
+            <a:r>
+              <a:rPr lang="es-ES" dirty="0" smtClean="0"/>
+              <a:t>1 MW escenario 4</a:t>
+            </a:r>
+            <a:endParaRPr lang="es-ES" dirty="0"/>
+          </a:p>
+        </p:txBody>
+      </p:sp>
+      <p:sp>
+        <p:nvSpPr>
+          <p:cNvPr id="9" name="CuadroTexto 8"/>
+          <p:cNvSpPr txBox="1"/>
+          <p:nvPr/>
+        </p:nvSpPr>
+        <p:spPr>
+          <a:xfrm>
+            <a:off x="7699862" y="1584687"/>
+            <a:ext cx="2007857" cy="369332"/>
+          </a:xfrm>
+          <a:prstGeom prst="rect">
+            <a:avLst/>
+          </a:prstGeom>
+          <a:noFill/>
+        </p:spPr>
+        <p:txBody>
+          <a:bodyPr wrap="none" rtlCol="0">
+            <a:spAutoFit/>
+          </a:bodyPr>
+          <a:lstStyle/>
+          <a:p>
+            <a:r>
+              <a:rPr lang="es-ES" dirty="0" smtClean="0"/>
+              <a:t>7,5 GW escenario 6</a:t>
+            </a:r>
+            <a:endParaRPr lang="es-ES" dirty="0"/>
+          </a:p>
+        </p:txBody>
+      </p:sp>
+      <p:graphicFrame>
+        <p:nvGraphicFramePr>
+          <p:cNvPr id="10" name="Tabla 9"/>
+          <p:cNvGraphicFramePr>
+            <a:graphicFrameLocks noGrp="1"/>
+          </p:cNvGraphicFramePr>
+          <p:nvPr>
+            <p:extLst>
+              <p:ext uri="{D42A27DB-BD31-4B8C-83A1-F6EECF244321}">
+                <p14:modId xmlns:p14="http://schemas.microsoft.com/office/powerpoint/2010/main" val="2205888931"/>
+              </p:ext>
+            </p:extLst>
+          </p:nvPr>
+        </p:nvGraphicFramePr>
+        <p:xfrm>
+          <a:off x="239107" y="5225986"/>
+          <a:ext cx="4299418" cy="1483360"/>
+        </p:xfrm>
+        <a:graphic>
+          <a:graphicData uri="http://schemas.openxmlformats.org/drawingml/2006/table">
+            <a:tbl>
+              <a:tblPr firstRow="1" bandRow="1">
+                <a:tableStyleId>{6E25E649-3F16-4E02-A733-19D2CDBF48F0}</a:tableStyleId>
+              </a:tblPr>
+              <a:tblGrid>
+                <a:gridCol w="2149709"/>
+                <a:gridCol w="2149709"/>
+              </a:tblGrid>
+              <a:tr h="370840">
+                <a:tc>
+                  <a:txBody>
+                    <a:bodyPr/>
+                    <a:lstStyle/>
+                    <a:p>
+                      <a:r>
+                        <a:rPr lang="es-ES" dirty="0" smtClean="0"/>
+                        <a:t>Compensación</a:t>
+                      </a:r>
+                      <a:endParaRPr lang="es-ES" dirty="0"/>
+                    </a:p>
+                  </a:txBody>
+                  <a:tcPr>
+                    <a:lnL w="12700" cap="flat" cmpd="sng" algn="ctr">
+                      <a:solidFill>
+                        <a:schemeClr val="tx1"/>
+                      </a:solidFill>
+                      <a:prstDash val="solid"/>
+                      <a:round/>
+                      <a:headEnd type="none" w="med" len="med"/>
+                      <a:tailEnd type="none" w="med" len="med"/>
+                    </a:lnL>
+                    <a:lnR w="12700" cap="flat" cmpd="sng" algn="ctr">
+                      <a:solidFill>
+                        <a:schemeClr val="tx1"/>
+                      </a:solidFill>
+                      <a:prstDash val="solid"/>
+                      <a:round/>
+                      <a:headEnd type="none" w="med" len="med"/>
+                      <a:tailEnd type="none" w="med" len="med"/>
+                    </a:lnR>
+                  </a:tcPr>
+                </a:tc>
+                <a:tc>
+                  <a:txBody>
+                    <a:bodyPr/>
+                    <a:lstStyle/>
+                    <a:p>
+                      <a:r>
+                        <a:rPr lang="es-ES" dirty="0" smtClean="0"/>
+                        <a:t>Error</a:t>
+                      </a:r>
+                      <a:endParaRPr lang="es-ES" dirty="0"/>
+                    </a:p>
+                  </a:txBody>
+                  <a:tcPr>
+                    <a:lnL w="12700" cap="flat" cmpd="sng" algn="ctr">
+                      <a:solidFill>
+                        <a:schemeClr val="tx1"/>
+                      </a:solidFill>
+                      <a:prstDash val="solid"/>
+                      <a:round/>
+                      <a:headEnd type="none" w="med" len="med"/>
+                      <a:tailEnd type="none" w="med" len="med"/>
+                    </a:lnL>
+                    <a:lnR w="12700" cap="flat" cmpd="sng" algn="ctr">
+                      <a:solidFill>
+                        <a:schemeClr val="tx1"/>
+                      </a:solidFill>
+                      <a:prstDash val="solid"/>
+                      <a:round/>
+                      <a:headEnd type="none" w="med" len="med"/>
+                      <a:tailEnd type="none" w="med" len="med"/>
+                    </a:lnR>
+                  </a:tcPr>
+                </a:tc>
+              </a:tr>
+              <a:tr h="370840">
+                <a:tc>
+                  <a:txBody>
+                    <a:bodyPr/>
+                    <a:lstStyle/>
+                    <a:p>
+                      <a:r>
+                        <a:rPr lang="es-ES" dirty="0" smtClean="0"/>
+                        <a:t>Ninguna</a:t>
+                      </a:r>
+                      <a:endParaRPr lang="es-ES" dirty="0"/>
+                    </a:p>
+                  </a:txBody>
+                  <a:tcPr>
+                    <a:lnR w="12700" cap="flat" cmpd="sng" algn="ctr">
+                      <a:solidFill>
+                        <a:schemeClr val="tx1"/>
+                      </a:solidFill>
+                      <a:prstDash val="solid"/>
+                      <a:round/>
+                      <a:headEnd type="none" w="med" len="med"/>
+                      <a:tailEnd type="none" w="med" len="med"/>
+                    </a:lnR>
+                  </a:tcPr>
+                </a:tc>
+                <a:tc>
+                  <a:txBody>
+                    <a:bodyPr/>
+                    <a:lstStyle/>
+                    <a:p>
+                      <a:r>
+                        <a:rPr lang="es-ES" dirty="0" smtClean="0"/>
+                        <a:t>3V</a:t>
+                      </a:r>
+                      <a:endParaRPr lang="es-ES" dirty="0"/>
+                    </a:p>
+                  </a:txBody>
+                  <a:tcPr>
+                    <a:lnL w="12700" cap="flat" cmpd="sng" algn="ctr">
+                      <a:solidFill>
+                        <a:schemeClr val="tx1"/>
+                      </a:solidFill>
+                      <a:prstDash val="solid"/>
+                      <a:round/>
+                      <a:headEnd type="none" w="med" len="med"/>
+                      <a:tailEnd type="none" w="med" len="med"/>
+                    </a:lnL>
+                  </a:tcPr>
+                </a:tc>
+              </a:tr>
+              <a:tr h="370840">
+                <a:tc>
+                  <a:txBody>
+                    <a:bodyPr/>
+                    <a:lstStyle/>
+                    <a:p>
+                      <a:r>
+                        <a:rPr lang="es-ES" dirty="0" smtClean="0"/>
+                        <a:t>Código de red</a:t>
+                      </a:r>
+                      <a:endParaRPr lang="es-ES" dirty="0"/>
+                    </a:p>
+                  </a:txBody>
+                  <a:tcPr>
+                    <a:lnR w="12700" cap="flat" cmpd="sng" algn="ctr">
+                      <a:solidFill>
+                        <a:schemeClr val="tx1"/>
+                      </a:solidFill>
+                      <a:prstDash val="solid"/>
+                      <a:round/>
+                      <a:headEnd type="none" w="med" len="med"/>
+                      <a:tailEnd type="none" w="med" len="med"/>
+                    </a:lnR>
+                  </a:tcPr>
+                </a:tc>
+                <a:tc>
+                  <a:txBody>
+                    <a:bodyPr/>
+                    <a:lstStyle/>
+                    <a:p>
+                      <a:r>
+                        <a:rPr lang="es-ES" dirty="0" smtClean="0"/>
+                        <a:t>3V</a:t>
+                      </a:r>
+                      <a:endParaRPr lang="es-ES" dirty="0"/>
+                    </a:p>
+                  </a:txBody>
+                  <a:tcPr>
+                    <a:lnL w="12700" cap="flat" cmpd="sng" algn="ctr">
+                      <a:solidFill>
+                        <a:schemeClr val="tx1"/>
+                      </a:solidFill>
+                      <a:prstDash val="solid"/>
+                      <a:round/>
+                      <a:headEnd type="none" w="med" len="med"/>
+                      <a:tailEnd type="none" w="med" len="med"/>
+                    </a:lnL>
+                  </a:tcPr>
+                </a:tc>
+              </a:tr>
+              <a:tr h="370840">
+                <a:tc>
+                  <a:txBody>
+                    <a:bodyPr/>
+                    <a:lstStyle/>
+                    <a:p>
+                      <a:r>
+                        <a:rPr lang="es-ES" dirty="0" smtClean="0"/>
+                        <a:t>Natural</a:t>
+                      </a:r>
+                      <a:endParaRPr lang="es-ES" dirty="0"/>
+                    </a:p>
+                  </a:txBody>
+                  <a:tcPr>
+                    <a:lnR w="12700" cap="flat" cmpd="sng" algn="ctr">
+                      <a:solidFill>
+                        <a:schemeClr val="tx1"/>
+                      </a:solidFill>
+                      <a:prstDash val="solid"/>
+                      <a:round/>
+                      <a:headEnd type="none" w="med" len="med"/>
+                      <a:tailEnd type="none" w="med" len="med"/>
+                    </a:lnR>
+                  </a:tcPr>
+                </a:tc>
+                <a:tc>
+                  <a:txBody>
+                    <a:bodyPr/>
+                    <a:lstStyle/>
+                    <a:p>
+                      <a:r>
+                        <a:rPr lang="es-ES" dirty="0" smtClean="0"/>
+                        <a:t>-27V</a:t>
+                      </a:r>
+                      <a:endParaRPr lang="es-ES" dirty="0"/>
+                    </a:p>
+                  </a:txBody>
+                  <a:tcPr>
+                    <a:lnL w="12700" cap="flat" cmpd="sng" algn="ctr">
+                      <a:solidFill>
+                        <a:schemeClr val="tx1"/>
+                      </a:solidFill>
+                      <a:prstDash val="solid"/>
+                      <a:round/>
+                      <a:headEnd type="none" w="med" len="med"/>
+                      <a:tailEnd type="none" w="med" len="med"/>
+                    </a:lnL>
+                  </a:tcPr>
+                </a:tc>
+              </a:tr>
+            </a:tbl>
+          </a:graphicData>
+        </a:graphic>
+      </p:graphicFrame>
+      <p:graphicFrame>
+        <p:nvGraphicFramePr>
+          <p:cNvPr id="11" name="Tabla 10"/>
+          <p:cNvGraphicFramePr>
+            <a:graphicFrameLocks noGrp="1"/>
+          </p:cNvGraphicFramePr>
+          <p:nvPr>
+            <p:extLst>
+              <p:ext uri="{D42A27DB-BD31-4B8C-83A1-F6EECF244321}">
+                <p14:modId xmlns:p14="http://schemas.microsoft.com/office/powerpoint/2010/main" val="4086063831"/>
+              </p:ext>
+            </p:extLst>
+          </p:nvPr>
+        </p:nvGraphicFramePr>
+        <p:xfrm>
+          <a:off x="5390866" y="5225986"/>
+          <a:ext cx="4299418" cy="1483360"/>
+        </p:xfrm>
+        <a:graphic>
+          <a:graphicData uri="http://schemas.openxmlformats.org/drawingml/2006/table">
+            <a:tbl>
+              <a:tblPr firstRow="1" bandRow="1">
+                <a:tableStyleId>{6E25E649-3F16-4E02-A733-19D2CDBF48F0}</a:tableStyleId>
+              </a:tblPr>
+              <a:tblGrid>
+                <a:gridCol w="2149709"/>
+                <a:gridCol w="2149709"/>
+              </a:tblGrid>
+              <a:tr h="370840">
+                <a:tc>
+                  <a:txBody>
+                    <a:bodyPr/>
+                    <a:lstStyle/>
+                    <a:p>
+                      <a:r>
+                        <a:rPr lang="es-ES" dirty="0" smtClean="0"/>
+                        <a:t>Compensación</a:t>
+                      </a:r>
+                      <a:endParaRPr lang="es-ES" dirty="0"/>
+                    </a:p>
+                  </a:txBody>
+                  <a:tcPr>
+                    <a:lnL w="12700" cap="flat" cmpd="sng" algn="ctr">
+                      <a:solidFill>
+                        <a:schemeClr val="tx1"/>
+                      </a:solidFill>
+                      <a:prstDash val="solid"/>
+                      <a:round/>
+                      <a:headEnd type="none" w="med" len="med"/>
+                      <a:tailEnd type="none" w="med" len="med"/>
+                    </a:lnL>
+                    <a:lnR w="12700" cap="flat" cmpd="sng" algn="ctr">
+                      <a:solidFill>
+                        <a:schemeClr val="tx1"/>
+                      </a:solidFill>
+                      <a:prstDash val="solid"/>
+                      <a:round/>
+                      <a:headEnd type="none" w="med" len="med"/>
+                      <a:tailEnd type="none" w="med" len="med"/>
+                    </a:lnR>
+                  </a:tcPr>
+                </a:tc>
+                <a:tc>
+                  <a:txBody>
+                    <a:bodyPr/>
+                    <a:lstStyle/>
+                    <a:p>
+                      <a:r>
+                        <a:rPr lang="es-ES" dirty="0" smtClean="0"/>
+                        <a:t>Error</a:t>
+                      </a:r>
+                      <a:endParaRPr lang="es-ES" dirty="0"/>
+                    </a:p>
+                  </a:txBody>
+                  <a:tcPr>
+                    <a:lnL w="12700" cap="flat" cmpd="sng" algn="ctr">
+                      <a:solidFill>
+                        <a:schemeClr val="tx1"/>
+                      </a:solidFill>
+                      <a:prstDash val="solid"/>
+                      <a:round/>
+                      <a:headEnd type="none" w="med" len="med"/>
+                      <a:tailEnd type="none" w="med" len="med"/>
+                    </a:lnL>
+                    <a:lnR w="12700" cap="flat" cmpd="sng" algn="ctr">
+                      <a:solidFill>
+                        <a:schemeClr val="tx1"/>
+                      </a:solidFill>
+                      <a:prstDash val="solid"/>
+                      <a:round/>
+                      <a:headEnd type="none" w="med" len="med"/>
+                      <a:tailEnd type="none" w="med" len="med"/>
+                    </a:lnR>
+                  </a:tcPr>
+                </a:tc>
+              </a:tr>
+              <a:tr h="370840">
+                <a:tc>
+                  <a:txBody>
+                    <a:bodyPr/>
+                    <a:lstStyle/>
+                    <a:p>
+                      <a:r>
+                        <a:rPr lang="es-ES" dirty="0" smtClean="0"/>
+                        <a:t>Ninguna</a:t>
+                      </a:r>
+                      <a:endParaRPr lang="es-ES" dirty="0"/>
+                    </a:p>
+                  </a:txBody>
+                  <a:tcPr>
+                    <a:lnR w="12700" cap="flat" cmpd="sng" algn="ctr">
+                      <a:solidFill>
+                        <a:schemeClr val="tx1"/>
+                      </a:solidFill>
+                      <a:prstDash val="solid"/>
+                      <a:round/>
+                      <a:headEnd type="none" w="med" len="med"/>
+                      <a:tailEnd type="none" w="med" len="med"/>
+                    </a:lnR>
+                  </a:tcPr>
+                </a:tc>
+                <a:tc>
+                  <a:txBody>
+                    <a:bodyPr/>
+                    <a:lstStyle/>
+                    <a:p>
+                      <a:r>
+                        <a:rPr lang="es-ES" dirty="0" smtClean="0"/>
+                        <a:t>7.75kV</a:t>
+                      </a:r>
+                      <a:endParaRPr lang="es-ES" dirty="0"/>
+                    </a:p>
+                  </a:txBody>
+                  <a:tcPr>
+                    <a:lnL w="12700" cap="flat" cmpd="sng" algn="ctr">
+                      <a:solidFill>
+                        <a:schemeClr val="tx1"/>
+                      </a:solidFill>
+                      <a:prstDash val="solid"/>
+                      <a:round/>
+                      <a:headEnd type="none" w="med" len="med"/>
+                      <a:tailEnd type="none" w="med" len="med"/>
+                    </a:lnL>
+                  </a:tcPr>
+                </a:tc>
+              </a:tr>
+              <a:tr h="370840">
+                <a:tc>
+                  <a:txBody>
+                    <a:bodyPr/>
+                    <a:lstStyle/>
+                    <a:p>
+                      <a:r>
+                        <a:rPr lang="es-ES" dirty="0" smtClean="0"/>
+                        <a:t>Código de red</a:t>
+                      </a:r>
+                      <a:endParaRPr lang="es-ES" dirty="0"/>
+                    </a:p>
+                  </a:txBody>
+                  <a:tcPr>
+                    <a:lnR w="12700" cap="flat" cmpd="sng" algn="ctr">
+                      <a:solidFill>
+                        <a:schemeClr val="tx1"/>
+                      </a:solidFill>
+                      <a:prstDash val="solid"/>
+                      <a:round/>
+                      <a:headEnd type="none" w="med" len="med"/>
+                      <a:tailEnd type="none" w="med" len="med"/>
+                    </a:lnR>
+                  </a:tcPr>
+                </a:tc>
+                <a:tc>
+                  <a:txBody>
+                    <a:bodyPr/>
+                    <a:lstStyle/>
+                    <a:p>
+                      <a:r>
+                        <a:rPr lang="es-ES" dirty="0" smtClean="0"/>
+                        <a:t>5.1kV</a:t>
+                      </a:r>
+                      <a:endParaRPr lang="es-ES" dirty="0"/>
+                    </a:p>
+                  </a:txBody>
+                  <a:tcPr>
+                    <a:lnL w="12700" cap="flat" cmpd="sng" algn="ctr">
+                      <a:solidFill>
+                        <a:schemeClr val="tx1"/>
+                      </a:solidFill>
+                      <a:prstDash val="solid"/>
+                      <a:round/>
+                      <a:headEnd type="none" w="med" len="med"/>
+                      <a:tailEnd type="none" w="med" len="med"/>
+                    </a:lnL>
+                  </a:tcPr>
+                </a:tc>
+              </a:tr>
+              <a:tr h="370840">
+                <a:tc>
+                  <a:txBody>
+                    <a:bodyPr/>
+                    <a:lstStyle/>
+                    <a:p>
+                      <a:r>
+                        <a:rPr lang="es-ES" dirty="0" smtClean="0"/>
+                        <a:t>Natural</a:t>
+                      </a:r>
+                      <a:endParaRPr lang="es-ES" dirty="0"/>
+                    </a:p>
+                  </a:txBody>
+                  <a:tcPr>
+                    <a:lnR w="12700" cap="flat" cmpd="sng" algn="ctr">
+                      <a:solidFill>
+                        <a:schemeClr val="tx1"/>
+                      </a:solidFill>
+                      <a:prstDash val="solid"/>
+                      <a:round/>
+                      <a:headEnd type="none" w="med" len="med"/>
+                      <a:tailEnd type="none" w="med" len="med"/>
+                    </a:lnR>
+                  </a:tcPr>
+                </a:tc>
+                <a:tc>
+                  <a:txBody>
+                    <a:bodyPr/>
+                    <a:lstStyle/>
+                    <a:p>
+                      <a:r>
+                        <a:rPr lang="es-ES" dirty="0" smtClean="0"/>
+                        <a:t>3.1kV</a:t>
+                      </a:r>
+                      <a:endParaRPr lang="es-ES" dirty="0"/>
+                    </a:p>
+                  </a:txBody>
+                  <a:tcPr>
+                    <a:lnL w="12700" cap="flat" cmpd="sng" algn="ctr">
+                      <a:solidFill>
+                        <a:schemeClr val="tx1"/>
+                      </a:solidFill>
+                      <a:prstDash val="solid"/>
+                      <a:round/>
+                      <a:headEnd type="none" w="med" len="med"/>
+                      <a:tailEnd type="none" w="med" len="med"/>
+                    </a:lnL>
+                  </a:tcPr>
+                </a:tc>
+              </a:tr>
+            </a:tbl>
+          </a:graphicData>
+        </a:graphic>
+      </p:graphicFrame>
+    </p:spTree>
+    <p:extLst>
+      <p:ext uri="{BB962C8B-B14F-4D97-AF65-F5344CB8AC3E}">
+        <p14:creationId xmlns:p14="http://schemas.microsoft.com/office/powerpoint/2010/main" val="2533352451"/>
+      </p:ext>
+    </p:extLst>
+  </p:cSld>
+  <p:clrMapOvr>
+    <a:masterClrMapping/>
+  </p:clrMapOvr>
+  <p:timing>
+    <p:tnLst>
+      <p:par>
+        <p:cTn id="1" dur="indefinite" restart="never" nodeType="tmRoot">
+          <p:childTnLst>
+            <p:seq concurrent="1" nextAc="seek">
+              <p:cTn id="2" dur="indefinite" nodeType="mainSeq">
+                <p:childTnLst>
+                  <p:par>
+                    <p:cTn id="3" fill="hold">
+                      <p:stCondLst>
+                        <p:cond delay="indefinite"/>
+                      </p:stCondLst>
+                      <p:childTnLst>
+                        <p:par>
+                          <p:cTn id="4" fill="hold">
+                            <p:stCondLst>
+                              <p:cond delay="0"/>
+                            </p:stCondLst>
+                            <p:childTnLst>
+                              <p:par>
+                                <p:cTn id="5" presetID="1" presetClass="entr" presetSubtype="0" fill="hold" nodeType="clickEffect">
+                                  <p:stCondLst>
+                                    <p:cond delay="0"/>
+                                  </p:stCondLst>
+                                  <p:childTnLst>
+                                    <p:set>
+                                      <p:cBhvr>
+                                        <p:cTn id="6" dur="1" fill="hold">
+                                          <p:stCondLst>
+                                            <p:cond delay="0"/>
+                                          </p:stCondLst>
+                                        </p:cTn>
+                                        <p:tgtEl>
+                                          <p:spTgt spid="3"/>
+                                        </p:tgtEl>
+                                        <p:attrNameLst>
+                                          <p:attrName>style.visibility</p:attrName>
+                                        </p:attrNameLst>
+                                      </p:cBhvr>
+                                      <p:to>
+                                        <p:strVal val="visible"/>
+                                      </p:to>
+                                    </p:set>
+                                  </p:childTnLst>
+                                </p:cTn>
+                              </p:par>
+                              <p:par>
+                                <p:cTn id="7" presetID="1" presetClass="entr" presetSubtype="0" fill="hold" grpId="0" nodeType="withEffect">
+                                  <p:stCondLst>
+                                    <p:cond delay="0"/>
+                                  </p:stCondLst>
+                                  <p:childTnLst>
+                                    <p:set>
+                                      <p:cBhvr>
+                                        <p:cTn id="8" dur="1" fill="hold">
+                                          <p:stCondLst>
+                                            <p:cond delay="0"/>
+                                          </p:stCondLst>
+                                        </p:cTn>
+                                        <p:tgtEl>
+                                          <p:spTgt spid="8"/>
+                                        </p:tgtEl>
+                                        <p:attrNameLst>
+                                          <p:attrName>style.visibility</p:attrName>
+                                        </p:attrNameLst>
+                                      </p:cBhvr>
+                                      <p:to>
+                                        <p:strVal val="visible"/>
+                                      </p:to>
+                                    </p:set>
+                                  </p:childTnLst>
+                                </p:cTn>
+                              </p:par>
+                              <p:par>
+                                <p:cTn id="9" presetID="1" presetClass="entr" presetSubtype="0" fill="hold" nodeType="withEffect">
+                                  <p:stCondLst>
+                                    <p:cond delay="0"/>
+                                  </p:stCondLst>
+                                  <p:childTnLst>
+                                    <p:set>
+                                      <p:cBhvr>
+                                        <p:cTn id="10" dur="1" fill="hold">
+                                          <p:stCondLst>
+                                            <p:cond delay="0"/>
+                                          </p:stCondLst>
+                                        </p:cTn>
+                                        <p:tgtEl>
+                                          <p:spTgt spid="10"/>
+                                        </p:tgtEl>
+                                        <p:attrNameLst>
+                                          <p:attrName>style.visibility</p:attrName>
+                                        </p:attrNameLst>
+                                      </p:cBhvr>
+                                      <p:to>
+                                        <p:strVal val="visible"/>
+                                      </p:to>
+                                    </p:set>
+                                  </p:childTnLst>
+                                </p:cTn>
+                              </p:par>
+                            </p:childTnLst>
+                          </p:cTn>
+                        </p:par>
+                      </p:childTnLst>
+                    </p:cTn>
+                  </p:par>
+                  <p:par>
+                    <p:cTn id="11" fill="hold">
+                      <p:stCondLst>
+                        <p:cond delay="indefinite"/>
+                      </p:stCondLst>
+                      <p:childTnLst>
+                        <p:par>
+                          <p:cTn id="12" fill="hold">
+                            <p:stCondLst>
+                              <p:cond delay="0"/>
+                            </p:stCondLst>
+                            <p:childTnLst>
+                              <p:par>
+                                <p:cTn id="13" presetID="1" presetClass="entr" presetSubtype="0" fill="hold" nodeType="clickEffect">
+                                  <p:stCondLst>
+                                    <p:cond delay="0"/>
+                                  </p:stCondLst>
+                                  <p:childTnLst>
+                                    <p:set>
+                                      <p:cBhvr>
+                                        <p:cTn id="14" dur="1" fill="hold">
+                                          <p:stCondLst>
+                                            <p:cond delay="0"/>
+                                          </p:stCondLst>
+                                        </p:cTn>
+                                        <p:tgtEl>
+                                          <p:spTgt spid="6"/>
+                                        </p:tgtEl>
+                                        <p:attrNameLst>
+                                          <p:attrName>style.visibility</p:attrName>
+                                        </p:attrNameLst>
+                                      </p:cBhvr>
+                                      <p:to>
+                                        <p:strVal val="visible"/>
+                                      </p:to>
+                                    </p:set>
+                                  </p:childTnLst>
+                                </p:cTn>
+                              </p:par>
+                              <p:par>
+                                <p:cTn id="15" presetID="1" presetClass="entr" presetSubtype="0" fill="hold" grpId="0" nodeType="withEffect">
+                                  <p:stCondLst>
+                                    <p:cond delay="0"/>
+                                  </p:stCondLst>
+                                  <p:childTnLst>
+                                    <p:set>
+                                      <p:cBhvr>
+                                        <p:cTn id="16" dur="1" fill="hold">
+                                          <p:stCondLst>
+                                            <p:cond delay="0"/>
+                                          </p:stCondLst>
+                                        </p:cTn>
+                                        <p:tgtEl>
+                                          <p:spTgt spid="9"/>
+                                        </p:tgtEl>
+                                        <p:attrNameLst>
+                                          <p:attrName>style.visibility</p:attrName>
+                                        </p:attrNameLst>
+                                      </p:cBhvr>
+                                      <p:to>
+                                        <p:strVal val="visible"/>
+                                      </p:to>
+                                    </p:set>
+                                  </p:childTnLst>
+                                </p:cTn>
+                              </p:par>
+                              <p:par>
+                                <p:cTn id="17" presetID="1" presetClass="entr" presetSubtype="0" fill="hold" nodeType="withEffect">
+                                  <p:stCondLst>
+                                    <p:cond delay="0"/>
+                                  </p:stCondLst>
+                                  <p:childTnLst>
+                                    <p:set>
+                                      <p:cBhvr>
+                                        <p:cTn id="18" dur="1" fill="hold">
+                                          <p:stCondLst>
+                                            <p:cond delay="0"/>
+                                          </p:stCondLst>
+                                        </p:cTn>
+                                        <p:tgtEl>
+                                          <p:spTgt spid="11"/>
+                                        </p:tgtEl>
+                                        <p:attrNameLst>
+                                          <p:attrName>style.visibility</p:attrName>
+                                        </p:attrNameLst>
+                                      </p:cBhvr>
+                                      <p:to>
+                                        <p:strVal val="visible"/>
+                                      </p:to>
+                                    </p:set>
+                                  </p:childTnLst>
+                                </p:cTn>
+                              </p:par>
+                            </p:childTnLst>
+                          </p:cTn>
+                        </p:par>
+                      </p:childTnLst>
+                    </p:cTn>
+                  </p:par>
+                </p:childTnLst>
+              </p:cTn>
+              <p:prevCondLst>
+                <p:cond evt="onPrev" delay="0">
+                  <p:tgtEl>
+                    <p:sldTgt/>
+                  </p:tgtEl>
+                </p:cond>
+              </p:prevCondLst>
+              <p:nextCondLst>
+                <p:cond evt="onNext" delay="0">
+                  <p:tgtEl>
+                    <p:sldTgt/>
+                  </p:tgtEl>
+                </p:cond>
+              </p:nextCondLst>
+            </p:seq>
+          </p:childTnLst>
+        </p:cTn>
+      </p:par>
+    </p:tnLst>
+    <p:bldLst>
+      <p:bldP spid="8" grpId="0"/>
+      <p:bldP spid="9" grpId="0"/>
+    </p:bldLst>
+  </p:timing>
+</p:sld>
+</file>
+
+<file path=ppt/slides/slide24.xml><?xml version="1.0" encoding="utf-8"?>
 <p:sld xmlns:a="http://schemas.openxmlformats.org/drawingml/2006/main" xmlns:r="http://schemas.openxmlformats.org/officeDocument/2006/relationships" xmlns:p="http://schemas.openxmlformats.org/presentationml/2006/main">
   <p:cSld>
     <p:spTree>
@@ -11595,7 +13147,7 @@
 </p:sld>
 </file>
 
-<file path=ppt/slides/slide23.xml><?xml version="1.0" encoding="utf-8"?>
+<file path=ppt/slides/slide25.xml><?xml version="1.0" encoding="utf-8"?>
 <p:sld xmlns:a="http://schemas.openxmlformats.org/drawingml/2006/main" xmlns:r="http://schemas.openxmlformats.org/officeDocument/2006/relationships" xmlns:p="http://schemas.openxmlformats.org/presentationml/2006/main">
   <p:cSld>
     <p:spTree>
@@ -12026,7 +13578,7 @@
 </p:sld>
 </file>
 
-<file path=ppt/slides/slide24.xml><?xml version="1.0" encoding="utf-8"?>
+<file path=ppt/slides/slide26.xml><?xml version="1.0" encoding="utf-8"?>
 <p:sld xmlns:a="http://schemas.openxmlformats.org/drawingml/2006/main" xmlns:r="http://schemas.openxmlformats.org/officeDocument/2006/relationships" xmlns:p="http://schemas.openxmlformats.org/presentationml/2006/main">
   <p:cSld>
     <p:spTree>
@@ -12445,7 +13997,7 @@
 </p:sld>
 </file>
 
-<file path=ppt/slides/slide25.xml><?xml version="1.0" encoding="utf-8"?>
+<file path=ppt/slides/slide27.xml><?xml version="1.0" encoding="utf-8"?>
 <p:sld xmlns:a="http://schemas.openxmlformats.org/drawingml/2006/main" xmlns:r="http://schemas.openxmlformats.org/officeDocument/2006/relationships" xmlns:p="http://schemas.openxmlformats.org/presentationml/2006/main">
   <p:cSld>
     <p:spTree>
@@ -13847,24 +15399,33 @@
             <p:ph idx="1"/>
           </p:nvPr>
         </p:nvSpPr>
-        <p:spPr/>
+        <p:spPr>
+          <a:xfrm>
+            <a:off x="838200" y="1690688"/>
+            <a:ext cx="10515600" cy="4351338"/>
+          </a:xfrm>
+        </p:spPr>
         <p:txBody>
           <a:bodyPr/>
           <a:lstStyle/>
           <a:p>
             <a:r>
               <a:rPr lang="es-ES" dirty="0" smtClean="0"/>
-              <a:t>Modelar el circuito de conexión a red en Simulink</a:t>
-            </a:r>
-          </a:p>
-          <a:p>
+              <a:t>Mode</a:t>
+            </a:r>
+            <a:r>
+              <a:rPr lang="es-ES" dirty="0"/>
+              <a:t>lar </a:t>
+            </a:r>
             <a:r>
               <a:rPr lang="es-ES" dirty="0" smtClean="0"/>
-              <a:t>Desarrollo </a:t>
-            </a:r>
-            <a:r>
-              <a:rPr lang="es-ES" dirty="0"/>
-              <a:t>del control de tensión–reactiva según del P.O. 7.4</a:t>
+              <a:t>el circuito de conexión a red en Simulink</a:t>
+            </a:r>
+          </a:p>
+          <a:p>
+            <a:r>
+              <a:rPr lang="es-ES" dirty="0" smtClean="0"/>
+              <a:t>Desarrollo del control de tensión–reactiva según del P.O. 7.4</a:t>
             </a:r>
           </a:p>
           <a:p>
@@ -14762,11 +16323,7 @@
           <a:p>
             <a:r>
               <a:rPr lang="es-ES" dirty="0" smtClean="0"/>
-              <a:t>Controladores </a:t>
-            </a:r>
-            <a:r>
-              <a:rPr lang="es-ES" dirty="0" smtClean="0"/>
-              <a:t>PI en la industria, investigación en controles avanzados</a:t>
+              <a:t>Controladores PI en la industria, investigación en controles avanzados</a:t>
             </a:r>
             <a:endParaRPr lang="es-ES" dirty="0"/>
           </a:p>
@@ -15451,14 +17008,13 @@
               <a:t>Modos de control para activa y </a:t>
             </a:r>
             <a:r>
-              <a:rPr lang="es-ES" dirty="0" err="1" smtClean="0"/>
-              <a:t>reativa</a:t>
+              <a:rPr lang="es-ES" dirty="0" smtClean="0"/>
+              <a:t>reactiva</a:t>
             </a:r>
             <a:r>
               <a:rPr lang="es-ES" dirty="0" smtClean="0"/>
               <a:t>:</a:t>
             </a:r>
-            <a:endParaRPr lang="es-ES" dirty="0" smtClean="0"/>
           </a:p>
           <a:p>
             <a:r>
@@ -15485,7 +17041,6 @@
               <a:rPr lang="es-ES" dirty="0" smtClean="0"/>
               <a:t>, Delta</a:t>
             </a:r>
-            <a:endParaRPr lang="es-ES" dirty="0" smtClean="0"/>
           </a:p>
           <a:p>
             <a:r>

</xml_diff>